<commit_message>
[RM Ch08] Updated Telco Operator Platform source
Updated Telco Operator Platform source pptx file uploaded
</commit_message>
<xml_diff>
--- a/doc/ref_model/artefacts/RM-Ch08-Telco-Operator-Platform.pptx
+++ b/doc/ref_model/artefacts/RM-Ch08-Telco-Operator-Platform.pptx
@@ -5,7 +5,7 @@
     <p:sldMasterId id="2147483648" r:id="rId1"/>
   </p:sldMasterIdLst>
   <p:sldIdLst>
-    <p:sldId id="256" r:id="rId2"/>
+    <p:sldId id="259" r:id="rId2"/>
   </p:sldIdLst>
   <p:sldSz cx="12192000" cy="6858000"/>
   <p:notesSz cx="6858000" cy="9144000"/>
@@ -259,7 +259,7 @@
           <a:p>
             <a:fld id="{EC95B1E8-06C4-4CA3-B46A-A1BFE36E62E1}" type="datetimeFigureOut">
               <a:rPr lang="en-US" smtClean="0"/>
-              <a:t>12/7/2020</a:t>
+              <a:t>12/12/2020</a:t>
             </a:fld>
             <a:endParaRPr lang="en-US"/>
           </a:p>
@@ -457,7 +457,7 @@
           <a:p>
             <a:fld id="{EC95B1E8-06C4-4CA3-B46A-A1BFE36E62E1}" type="datetimeFigureOut">
               <a:rPr lang="en-US" smtClean="0"/>
-              <a:t>12/7/2020</a:t>
+              <a:t>12/12/2020</a:t>
             </a:fld>
             <a:endParaRPr lang="en-US"/>
           </a:p>
@@ -665,7 +665,7 @@
           <a:p>
             <a:fld id="{EC95B1E8-06C4-4CA3-B46A-A1BFE36E62E1}" type="datetimeFigureOut">
               <a:rPr lang="en-US" smtClean="0"/>
-              <a:t>12/7/2020</a:t>
+              <a:t>12/12/2020</a:t>
             </a:fld>
             <a:endParaRPr lang="en-US"/>
           </a:p>
@@ -863,7 +863,7 @@
           <a:p>
             <a:fld id="{EC95B1E8-06C4-4CA3-B46A-A1BFE36E62E1}" type="datetimeFigureOut">
               <a:rPr lang="en-US" smtClean="0"/>
-              <a:t>12/7/2020</a:t>
+              <a:t>12/12/2020</a:t>
             </a:fld>
             <a:endParaRPr lang="en-US"/>
           </a:p>
@@ -1138,7 +1138,7 @@
           <a:p>
             <a:fld id="{EC95B1E8-06C4-4CA3-B46A-A1BFE36E62E1}" type="datetimeFigureOut">
               <a:rPr lang="en-US" smtClean="0"/>
-              <a:t>12/7/2020</a:t>
+              <a:t>12/12/2020</a:t>
             </a:fld>
             <a:endParaRPr lang="en-US"/>
           </a:p>
@@ -1403,7 +1403,7 @@
           <a:p>
             <a:fld id="{EC95B1E8-06C4-4CA3-B46A-A1BFE36E62E1}" type="datetimeFigureOut">
               <a:rPr lang="en-US" smtClean="0"/>
-              <a:t>12/7/2020</a:t>
+              <a:t>12/12/2020</a:t>
             </a:fld>
             <a:endParaRPr lang="en-US"/>
           </a:p>
@@ -1815,7 +1815,7 @@
           <a:p>
             <a:fld id="{EC95B1E8-06C4-4CA3-B46A-A1BFE36E62E1}" type="datetimeFigureOut">
               <a:rPr lang="en-US" smtClean="0"/>
-              <a:t>12/7/2020</a:t>
+              <a:t>12/12/2020</a:t>
             </a:fld>
             <a:endParaRPr lang="en-US"/>
           </a:p>
@@ -1956,7 +1956,7 @@
           <a:p>
             <a:fld id="{EC95B1E8-06C4-4CA3-B46A-A1BFE36E62E1}" type="datetimeFigureOut">
               <a:rPr lang="en-US" smtClean="0"/>
-              <a:t>12/7/2020</a:t>
+              <a:t>12/12/2020</a:t>
             </a:fld>
             <a:endParaRPr lang="en-US"/>
           </a:p>
@@ -2069,7 +2069,7 @@
           <a:p>
             <a:fld id="{EC95B1E8-06C4-4CA3-B46A-A1BFE36E62E1}" type="datetimeFigureOut">
               <a:rPr lang="en-US" smtClean="0"/>
-              <a:t>12/7/2020</a:t>
+              <a:t>12/12/2020</a:t>
             </a:fld>
             <a:endParaRPr lang="en-US"/>
           </a:p>
@@ -2380,7 +2380,7 @@
           <a:p>
             <a:fld id="{EC95B1E8-06C4-4CA3-B46A-A1BFE36E62E1}" type="datetimeFigureOut">
               <a:rPr lang="en-US" smtClean="0"/>
-              <a:t>12/7/2020</a:t>
+              <a:t>12/12/2020</a:t>
             </a:fld>
             <a:endParaRPr lang="en-US"/>
           </a:p>
@@ -2668,7 +2668,7 @@
           <a:p>
             <a:fld id="{EC95B1E8-06C4-4CA3-B46A-A1BFE36E62E1}" type="datetimeFigureOut">
               <a:rPr lang="en-US" smtClean="0"/>
-              <a:t>12/7/2020</a:t>
+              <a:t>12/12/2020</a:t>
             </a:fld>
             <a:endParaRPr lang="en-US"/>
           </a:p>
@@ -2909,7 +2909,7 @@
           <a:p>
             <a:fld id="{EC95B1E8-06C4-4CA3-B46A-A1BFE36E62E1}" type="datetimeFigureOut">
               <a:rPr lang="en-US" smtClean="0"/>
-              <a:t>12/7/2020</a:t>
+              <a:t>12/12/2020</a:t>
             </a:fld>
             <a:endParaRPr lang="en-US"/>
           </a:p>
@@ -3340,8 +3340,8 @@
         </p:nvSpPr>
         <p:spPr>
           <a:xfrm>
-            <a:off x="127000" y="1159475"/>
-            <a:ext cx="10047758" cy="5380990"/>
+            <a:off x="96867" y="1170738"/>
+            <a:ext cx="11337261" cy="5380990"/>
           </a:xfrm>
           <a:prstGeom prst="rect">
             <a:avLst/>
@@ -3374,7 +3374,7 @@
           <a:lstStyle/>
           <a:p>
             <a:pPr algn="ctr"/>
-            <a:endParaRPr lang="en-US"/>
+            <a:endParaRPr lang="en-US" dirty="0"/>
           </a:p>
         </p:txBody>
       </p:sp>
@@ -3392,8 +3392,8 @@
         </p:nvSpPr>
         <p:spPr>
           <a:xfrm>
-            <a:off x="3322895" y="5499100"/>
-            <a:ext cx="5182930" cy="850900"/>
+            <a:off x="4022015" y="5851454"/>
+            <a:ext cx="4769510" cy="496249"/>
           </a:xfrm>
           <a:prstGeom prst="rect">
             <a:avLst/>
@@ -3432,7 +3432,7 @@
                   <a:schemeClr val="tx1"/>
                 </a:solidFill>
               </a:rPr>
-              <a:t>Cloud Infrastructure Resources Layer</a:t>
+              <a:t>HW Infrastructure Layer</a:t>
             </a:r>
           </a:p>
         </p:txBody>
@@ -3451,8 +3451,8 @@
         </p:nvSpPr>
         <p:spPr>
           <a:xfrm>
-            <a:off x="3322895" y="4159250"/>
-            <a:ext cx="3935155" cy="850900"/>
+            <a:off x="5201233" y="3419541"/>
+            <a:ext cx="2411076" cy="850900"/>
           </a:xfrm>
           <a:prstGeom prst="rect">
             <a:avLst/>
@@ -3491,7 +3491,7 @@
                   <a:schemeClr val="tx1"/>
                 </a:solidFill>
               </a:rPr>
-              <a:t>Cloud Platform Components Layer</a:t>
+              <a:t>Platform Services Layer</a:t>
             </a:r>
           </a:p>
           <a:p>
@@ -3502,7 +3502,7 @@
                   <a:schemeClr val="tx1"/>
                 </a:solidFill>
               </a:rPr>
-              <a:t>(DB, Message Q, Events, WFM, VM, Container, …)</a:t>
+              <a:t>(datastore, messaging…)</a:t>
             </a:r>
           </a:p>
         </p:txBody>
@@ -3521,8 +3521,8 @@
         </p:nvSpPr>
         <p:spPr>
           <a:xfrm>
-            <a:off x="3878262" y="2825750"/>
-            <a:ext cx="4627560" cy="850900"/>
+            <a:off x="4228721" y="1548277"/>
+            <a:ext cx="4356099" cy="850900"/>
           </a:xfrm>
           <a:prstGeom prst="rect">
             <a:avLst/>
@@ -3561,7 +3561,7 @@
                   <a:schemeClr val="tx1"/>
                 </a:solidFill>
               </a:rPr>
-              <a:t>Cloud Services Layer</a:t>
+              <a:t>Service and Application Layer</a:t>
             </a:r>
           </a:p>
           <a:p>
@@ -3572,26 +3572,22 @@
                   <a:schemeClr val="tx1"/>
                 </a:solidFill>
               </a:rPr>
-              <a:t>(Network Functions, Network Services, Applications, </a:t>
-            </a:r>
-          </a:p>
-          <a:p>
-            <a:pPr algn="ctr"/>
-            <a:r>
-              <a:rPr lang="en-US" sz="1400">
-                <a:solidFill>
-                  <a:schemeClr val="tx1"/>
-                </a:solidFill>
-              </a:rPr>
-              <a:t>Services &amp; Applications </a:t>
-            </a:r>
-            <a:r>
+              <a:t>(Network Service and Functions, other Applications</a:t>
+            </a:r>
+            <a:br>
               <a:rPr lang="en-US" sz="1400" dirty="0">
                 <a:solidFill>
                   <a:schemeClr val="tx1"/>
                 </a:solidFill>
               </a:rPr>
-              <a:t>Management)</a:t>
+            </a:br>
+            <a:r>
+              <a:rPr lang="en-US" sz="1400" dirty="0">
+                <a:solidFill>
+                  <a:schemeClr val="tx1"/>
+                </a:solidFill>
+              </a:rPr>
+              <a:t>and Application Control)</a:t>
             </a:r>
           </a:p>
         </p:txBody>
@@ -3610,8 +3606,8 @@
         </p:nvSpPr>
         <p:spPr>
           <a:xfrm>
-            <a:off x="7480097" y="4159250"/>
-            <a:ext cx="2499715" cy="850900"/>
+            <a:off x="7862192" y="4023046"/>
+            <a:ext cx="2740842" cy="850900"/>
           </a:xfrm>
           <a:prstGeom prst="roundRect">
             <a:avLst/>
@@ -3645,14 +3641,14 @@
           <a:p>
             <a:pPr algn="ctr"/>
             <a:r>
-              <a:rPr lang="en-US" b="1" dirty="0"/>
+              <a:rPr lang="en-US" sz="1600" b="1" dirty="0"/>
               <a:t>Cloud Resources Broker (CRB)</a:t>
             </a:r>
           </a:p>
           <a:p>
             <a:pPr algn="ctr"/>
             <a:r>
-              <a:rPr lang="en-US" sz="1200" b="1" dirty="0"/>
+              <a:rPr lang="en-US" sz="1100" b="1" dirty="0"/>
               <a:t>(Intra-/Inter- operator resource management)</a:t>
             </a:r>
           </a:p>
@@ -3672,8 +3668,8 @@
         </p:nvSpPr>
         <p:spPr>
           <a:xfrm>
-            <a:off x="4321176" y="1581150"/>
-            <a:ext cx="5426074" cy="850900"/>
+            <a:off x="8370050" y="2880760"/>
+            <a:ext cx="2740844" cy="850900"/>
           </a:xfrm>
           <a:prstGeom prst="roundRect">
             <a:avLst/>
@@ -3707,14 +3703,14 @@
           <a:p>
             <a:pPr algn="ctr"/>
             <a:r>
-              <a:rPr lang="en-US" b="1" dirty="0"/>
+              <a:rPr lang="en-US" sz="1600" b="1" dirty="0"/>
               <a:t>Cloud Services Broker (CSB)</a:t>
             </a:r>
           </a:p>
           <a:p>
             <a:pPr algn="ctr"/>
             <a:r>
-              <a:rPr lang="en-US" sz="1400" b="1" dirty="0"/>
+              <a:rPr lang="en-US" sz="1200" b="1" dirty="0"/>
               <a:t>(Service Intermediation, Aggregation, Integration, Customization)</a:t>
             </a:r>
           </a:p>
@@ -3734,20 +3730,19 @@
         </p:nvSpPr>
         <p:spPr>
           <a:xfrm>
-            <a:off x="2529348" y="1581150"/>
-            <a:ext cx="571500" cy="4768850"/>
+            <a:off x="2451528" y="1597842"/>
+            <a:ext cx="571500" cy="4752157"/>
           </a:xfrm>
           <a:prstGeom prst="rect">
             <a:avLst/>
           </a:prstGeom>
           <a:solidFill>
-            <a:schemeClr val="tx2">
-              <a:lumMod val="20000"/>
-              <a:lumOff val="80000"/>
+            <a:schemeClr val="bg1">
+              <a:lumMod val="95000"/>
             </a:schemeClr>
           </a:solidFill>
           <a:ln>
-            <a:noFill/>
+            <a:prstDash val="dash"/>
           </a:ln>
         </p:spPr>
         <p:style>
@@ -3777,7 +3772,7 @@
                   <a:schemeClr val="tx1"/>
                 </a:solidFill>
               </a:rPr>
-              <a:t>Security Management Framework</a:t>
+              <a:t>Security Management Framework*</a:t>
             </a:r>
           </a:p>
         </p:txBody>
@@ -3796,8 +3791,8 @@
         </p:nvSpPr>
         <p:spPr>
           <a:xfrm>
-            <a:off x="1599277" y="1581150"/>
-            <a:ext cx="571500" cy="4768850"/>
+            <a:off x="1521457" y="1597842"/>
+            <a:ext cx="571500" cy="4752157"/>
           </a:xfrm>
           <a:prstGeom prst="rect">
             <a:avLst/>
@@ -3808,7 +3803,7 @@
             </a:schemeClr>
           </a:solidFill>
           <a:ln>
-            <a:noFill/>
+            <a:prstDash val="dash"/>
           </a:ln>
         </p:spPr>
         <p:style>
@@ -3838,7 +3833,7 @@
                   <a:schemeClr val="tx1"/>
                 </a:solidFill>
               </a:rPr>
-              <a:t>Logging, Monitoring, Alerting (LMA) Framework</a:t>
+              <a:t>Logging, Monitoring, Alerting (LMA) Framework*</a:t>
             </a:r>
           </a:p>
         </p:txBody>
@@ -3857,19 +3852,19 @@
         </p:nvSpPr>
         <p:spPr>
           <a:xfrm>
-            <a:off x="218152" y="1581150"/>
-            <a:ext cx="1019175" cy="4768850"/>
+            <a:off x="140332" y="1597842"/>
+            <a:ext cx="1019175" cy="4752157"/>
           </a:xfrm>
           <a:prstGeom prst="rect">
             <a:avLst/>
           </a:prstGeom>
           <a:solidFill>
             <a:schemeClr val="bg1">
-              <a:lumMod val="95000"/>
+              <a:lumMod val="75000"/>
             </a:schemeClr>
           </a:solidFill>
           <a:ln>
-            <a:noFill/>
+            <a:prstDash val="dash"/>
           </a:ln>
         </p:spPr>
         <p:style>
@@ -3899,7 +3894,7 @@
                   <a:schemeClr val="tx1"/>
                 </a:solidFill>
               </a:rPr>
-              <a:t>Operations &amp; Management Framework</a:t>
+              <a:t>Operations &amp; Management Framework*</a:t>
             </a:r>
           </a:p>
           <a:p>
@@ -3929,7 +3924,7 @@
         </p:nvGrpSpPr>
         <p:grpSpPr>
           <a:xfrm>
-            <a:off x="3322895" y="132275"/>
+            <a:off x="3245075" y="132275"/>
             <a:ext cx="826829" cy="608399"/>
             <a:chOff x="3310860" y="406400"/>
             <a:chExt cx="826829" cy="608399"/>
@@ -4027,10 +4022,10 @@
         </p:nvGrpSpPr>
         <p:grpSpPr>
           <a:xfrm>
-            <a:off x="6449347" y="88213"/>
-            <a:ext cx="1160206" cy="677649"/>
-            <a:chOff x="5553486" y="337150"/>
-            <a:chExt cx="1160206" cy="677649"/>
+            <a:off x="6003413" y="112704"/>
+            <a:ext cx="1150873" cy="671299"/>
+            <a:chOff x="5553486" y="343500"/>
+            <a:chExt cx="1150873" cy="671299"/>
           </a:xfrm>
         </p:grpSpPr>
         <p:pic>
@@ -4067,7 +4062,7 @@
           </p:blipFill>
           <p:spPr>
             <a:xfrm>
-              <a:off x="6243792" y="343500"/>
+              <a:off x="6234459" y="343500"/>
               <a:ext cx="469900" cy="469900"/>
             </a:xfrm>
             <a:prstGeom prst="rect">
@@ -4186,7 +4181,7 @@
           </p:blipFill>
           <p:spPr>
             <a:xfrm>
-              <a:off x="5898639" y="337150"/>
+              <a:off x="5898639" y="344860"/>
               <a:ext cx="469900" cy="469900"/>
             </a:xfrm>
             <a:prstGeom prst="rect">
@@ -4197,53 +4192,6 @@
       </p:grpSp>
       <p:cxnSp>
         <p:nvCxnSpPr>
-          <p:cNvPr id="27" name="Straight Arrow Connector 26">
-            <a:extLst>
-              <a:ext uri="{FF2B5EF4-FFF2-40B4-BE49-F238E27FC236}">
-                <a16:creationId xmlns:a16="http://schemas.microsoft.com/office/drawing/2014/main" id="{F2791931-2DEB-493A-B341-1314FF341057}"/>
-              </a:ext>
-            </a:extLst>
-          </p:cNvPr>
-          <p:cNvCxnSpPr>
-            <a:stCxn id="8" idx="0"/>
-          </p:cNvCxnSpPr>
-          <p:nvPr/>
-        </p:nvCxnSpPr>
-        <p:spPr>
-          <a:xfrm flipH="1" flipV="1">
-            <a:off x="7029450" y="737800"/>
-            <a:ext cx="4763" cy="843350"/>
-          </a:xfrm>
-          <a:prstGeom prst="straightConnector1">
-            <a:avLst/>
-          </a:prstGeom>
-          <a:ln w="57150">
-            <a:solidFill>
-              <a:schemeClr val="bg2">
-                <a:lumMod val="50000"/>
-              </a:schemeClr>
-            </a:solidFill>
-            <a:headEnd type="triangle" w="med" len="med"/>
-            <a:tailEnd type="triangle" w="med" len="med"/>
-          </a:ln>
-        </p:spPr>
-        <p:style>
-          <a:lnRef idx="1">
-            <a:schemeClr val="accent1"/>
-          </a:lnRef>
-          <a:fillRef idx="0">
-            <a:schemeClr val="accent1"/>
-          </a:fillRef>
-          <a:effectRef idx="0">
-            <a:schemeClr val="accent1"/>
-          </a:effectRef>
-          <a:fontRef idx="minor">
-            <a:schemeClr val="tx1"/>
-          </a:fontRef>
-        </p:style>
-      </p:cxnSp>
-      <p:cxnSp>
-        <p:nvCxnSpPr>
           <p:cNvPr id="29" name="Straight Arrow Connector 28">
             <a:extLst>
               <a:ext uri="{FF2B5EF4-FFF2-40B4-BE49-F238E27FC236}">
@@ -4259,8 +4207,8 @@
         </p:nvCxnSpPr>
         <p:spPr>
           <a:xfrm flipV="1">
-            <a:off x="3736309" y="740674"/>
-            <a:ext cx="1" cy="3418578"/>
+            <a:off x="3637317" y="740674"/>
+            <a:ext cx="21173" cy="4047943"/>
           </a:xfrm>
           <a:prstGeom prst="straightConnector1">
             <a:avLst/>
@@ -4271,15 +4219,12 @@
               <a:lumOff val="40000"/>
             </a:schemeClr>
           </a:solidFill>
-          <a:ln w="57150">
+          <a:ln w="38100">
             <a:solidFill>
-              <a:schemeClr val="tx2">
-                <a:lumMod val="60000"/>
-                <a:lumOff val="40000"/>
-              </a:schemeClr>
+              <a:srgbClr val="C00000"/>
             </a:solidFill>
             <a:headEnd type="triangle" w="med" len="med"/>
-            <a:tailEnd type="triangle" w="med" len="med"/>
+            <a:tailEnd type="none" w="med" len="med"/>
           </a:ln>
         </p:spPr>
         <p:style>
@@ -4315,13 +4260,59 @@
         </p:nvCxnSpPr>
         <p:spPr>
           <a:xfrm>
-            <a:off x="3736309" y="2578100"/>
-            <a:ext cx="648365" cy="247650"/>
+            <a:off x="3654501" y="1300627"/>
+            <a:ext cx="1170418" cy="247650"/>
           </a:xfrm>
           <a:prstGeom prst="bentConnector3">
             <a:avLst>
-              <a:gd name="adj1" fmla="val 100928"/>
+              <a:gd name="adj1" fmla="val 99794"/>
             </a:avLst>
+          </a:prstGeom>
+          <a:ln w="38100">
+            <a:solidFill>
+              <a:srgbClr val="C00000"/>
+            </a:solidFill>
+            <a:headEnd type="none" w="med" len="med"/>
+            <a:tailEnd type="triangle" w="med" len="med"/>
+          </a:ln>
+        </p:spPr>
+        <p:style>
+          <a:lnRef idx="1">
+            <a:schemeClr val="accent1"/>
+          </a:lnRef>
+          <a:fillRef idx="0">
+            <a:schemeClr val="accent1"/>
+          </a:fillRef>
+          <a:effectRef idx="0">
+            <a:schemeClr val="accent1"/>
+          </a:effectRef>
+          <a:fontRef idx="minor">
+            <a:schemeClr val="tx1"/>
+          </a:fontRef>
+        </p:style>
+      </p:cxnSp>
+      <p:cxnSp>
+        <p:nvCxnSpPr>
+          <p:cNvPr id="43" name="Straight Arrow Connector 42">
+            <a:extLst>
+              <a:ext uri="{FF2B5EF4-FFF2-40B4-BE49-F238E27FC236}">
+                <a16:creationId xmlns:a16="http://schemas.microsoft.com/office/drawing/2014/main" id="{17AE24D2-2211-46AB-B017-260BBA96F818}"/>
+              </a:ext>
+            </a:extLst>
+          </p:cNvPr>
+          <p:cNvCxnSpPr>
+            <a:cxnSpLocks/>
+            <a:endCxn id="33" idx="0"/>
+          </p:cNvCxnSpPr>
+          <p:nvPr/>
+        </p:nvCxnSpPr>
+        <p:spPr>
+          <a:xfrm>
+            <a:off x="4499879" y="2412588"/>
+            <a:ext cx="0" cy="2376029"/>
+          </a:xfrm>
+          <a:prstGeom prst="straightConnector1">
+            <a:avLst/>
           </a:prstGeom>
           <a:ln w="57150">
             <a:solidFill>
@@ -4351,34 +4342,35 @@
       </p:cxnSp>
       <p:cxnSp>
         <p:nvCxnSpPr>
-          <p:cNvPr id="42" name="Straight Arrow Connector 41">
-            <a:extLst>
-              <a:ext uri="{FF2B5EF4-FFF2-40B4-BE49-F238E27FC236}">
-                <a16:creationId xmlns:a16="http://schemas.microsoft.com/office/drawing/2014/main" id="{4AC68526-52BC-4408-BC18-9F278528A16B}"/>
+          <p:cNvPr id="50" name="Straight Arrow Connector 49">
+            <a:extLst>
+              <a:ext uri="{FF2B5EF4-FFF2-40B4-BE49-F238E27FC236}">
+                <a16:creationId xmlns:a16="http://schemas.microsoft.com/office/drawing/2014/main" id="{9EB86015-E0B9-4C47-B5D6-6DF95ABD7755}"/>
               </a:ext>
             </a:extLst>
           </p:cNvPr>
           <p:cNvCxnSpPr>
             <a:cxnSpLocks/>
-            <a:stCxn id="5" idx="2"/>
+            <a:stCxn id="8" idx="2"/>
           </p:cNvCxnSpPr>
           <p:nvPr/>
         </p:nvCxnSpPr>
         <p:spPr>
           <a:xfrm>
-            <a:off x="5290473" y="5010150"/>
-            <a:ext cx="1" cy="488950"/>
+            <a:off x="9740472" y="3731660"/>
+            <a:ext cx="0" cy="291386"/>
           </a:xfrm>
           <a:prstGeom prst="straightConnector1">
             <a:avLst/>
           </a:prstGeom>
           <a:ln w="38100">
             <a:solidFill>
-              <a:schemeClr val="accent1">
-                <a:lumMod val="75000"/>
+              <a:schemeClr val="tx2">
+                <a:lumMod val="60000"/>
+                <a:lumOff val="40000"/>
               </a:schemeClr>
             </a:solidFill>
-            <a:headEnd type="triangle" w="med" len="med"/>
+            <a:headEnd type="none" w="med" len="med"/>
             <a:tailEnd type="triangle" w="med" len="med"/>
           </a:ln>
         </p:spPr>
@@ -4399,10 +4391,10 @@
       </p:cxnSp>
       <p:cxnSp>
         <p:nvCxnSpPr>
-          <p:cNvPr id="43" name="Straight Arrow Connector 42">
-            <a:extLst>
-              <a:ext uri="{FF2B5EF4-FFF2-40B4-BE49-F238E27FC236}">
-                <a16:creationId xmlns:a16="http://schemas.microsoft.com/office/drawing/2014/main" id="{17AE24D2-2211-46AB-B017-260BBA96F818}"/>
+          <p:cNvPr id="56" name="Straight Arrow Connector 55">
+            <a:extLst>
+              <a:ext uri="{FF2B5EF4-FFF2-40B4-BE49-F238E27FC236}">
+                <a16:creationId xmlns:a16="http://schemas.microsoft.com/office/drawing/2014/main" id="{1C04F207-21C1-45A4-BF32-F8572EA4EBA9}"/>
               </a:ext>
             </a:extLst>
           </p:cNvPr>
@@ -4413,20 +4405,20 @@
         </p:nvCxnSpPr>
         <p:spPr>
           <a:xfrm>
-            <a:off x="6179342" y="3683000"/>
-            <a:ext cx="0" cy="482600"/>
+            <a:off x="8204877" y="4883768"/>
+            <a:ext cx="0" cy="969982"/>
           </a:xfrm>
           <a:prstGeom prst="straightConnector1">
             <a:avLst/>
           </a:prstGeom>
           <a:ln w="38100">
             <a:solidFill>
-              <a:schemeClr val="accent5">
+              <a:schemeClr val="tx2">
                 <a:lumMod val="60000"/>
                 <a:lumOff val="40000"/>
               </a:schemeClr>
             </a:solidFill>
-            <a:headEnd type="triangle" w="med" len="med"/>
+            <a:headEnd type="none" w="med" len="med"/>
             <a:tailEnd type="triangle" w="med" len="med"/>
           </a:ln>
         </p:spPr>
@@ -4447,10 +4439,10 @@
       </p:cxnSp>
       <p:cxnSp>
         <p:nvCxnSpPr>
-          <p:cNvPr id="49" name="Straight Arrow Connector 48">
-            <a:extLst>
-              <a:ext uri="{FF2B5EF4-FFF2-40B4-BE49-F238E27FC236}">
-                <a16:creationId xmlns:a16="http://schemas.microsoft.com/office/drawing/2014/main" id="{ACCF1D3E-B49E-4A88-9206-D8E0402CC974}"/>
+          <p:cNvPr id="57" name="Straight Arrow Connector 56">
+            <a:extLst>
+              <a:ext uri="{FF2B5EF4-FFF2-40B4-BE49-F238E27FC236}">
+                <a16:creationId xmlns:a16="http://schemas.microsoft.com/office/drawing/2014/main" id="{C8D7D85E-7E0A-4ED7-96D8-6E2B39401B6D}"/>
               </a:ext>
             </a:extLst>
           </p:cNvPr>
@@ -4461,56 +4453,8 @@
         </p:nvCxnSpPr>
         <p:spPr>
           <a:xfrm>
-            <a:off x="8122442" y="3683000"/>
-            <a:ext cx="0" cy="482600"/>
-          </a:xfrm>
-          <a:prstGeom prst="straightConnector1">
-            <a:avLst/>
-          </a:prstGeom>
-          <a:ln w="38100">
-            <a:solidFill>
-              <a:schemeClr val="accent5">
-                <a:lumMod val="60000"/>
-                <a:lumOff val="40000"/>
-              </a:schemeClr>
-            </a:solidFill>
-            <a:headEnd type="triangle" w="med" len="med"/>
-            <a:tailEnd type="triangle" w="med" len="med"/>
-          </a:ln>
-        </p:spPr>
-        <p:style>
-          <a:lnRef idx="1">
-            <a:schemeClr val="accent1"/>
-          </a:lnRef>
-          <a:fillRef idx="0">
-            <a:schemeClr val="accent1"/>
-          </a:fillRef>
-          <a:effectRef idx="0">
-            <a:schemeClr val="accent1"/>
-          </a:effectRef>
-          <a:fontRef idx="minor">
-            <a:schemeClr val="tx1"/>
-          </a:fontRef>
-        </p:style>
-      </p:cxnSp>
-      <p:cxnSp>
-        <p:nvCxnSpPr>
-          <p:cNvPr id="50" name="Straight Arrow Connector 49">
-            <a:extLst>
-              <a:ext uri="{FF2B5EF4-FFF2-40B4-BE49-F238E27FC236}">
-                <a16:creationId xmlns:a16="http://schemas.microsoft.com/office/drawing/2014/main" id="{9EB86015-E0B9-4C47-B5D6-6DF95ABD7755}"/>
-              </a:ext>
-            </a:extLst>
-          </p:cNvPr>
-          <p:cNvCxnSpPr>
-            <a:cxnSpLocks/>
-          </p:cNvCxnSpPr>
-          <p:nvPr/>
-        </p:nvCxnSpPr>
-        <p:spPr>
-          <a:xfrm>
-            <a:off x="8892380" y="2432050"/>
-            <a:ext cx="0" cy="1727200"/>
+            <a:off x="10603034" y="4551393"/>
+            <a:ext cx="1031248" cy="0"/>
           </a:xfrm>
           <a:prstGeom prst="straightConnector1">
             <a:avLst/>
@@ -4543,71 +4487,23 @@
       </p:cxnSp>
       <p:cxnSp>
         <p:nvCxnSpPr>
-          <p:cNvPr id="53" name="Straight Arrow Connector 52">
-            <a:extLst>
-              <a:ext uri="{FF2B5EF4-FFF2-40B4-BE49-F238E27FC236}">
-                <a16:creationId xmlns:a16="http://schemas.microsoft.com/office/drawing/2014/main" id="{BD12DEC6-D30D-432F-8D4D-EFE777E2A35E}"/>
+          <p:cNvPr id="58" name="Straight Arrow Connector 57">
+            <a:extLst>
+              <a:ext uri="{FF2B5EF4-FFF2-40B4-BE49-F238E27FC236}">
+                <a16:creationId xmlns:a16="http://schemas.microsoft.com/office/drawing/2014/main" id="{5A7F895A-B909-4846-9BC5-77C0D1C934FF}"/>
               </a:ext>
             </a:extLst>
           </p:cNvPr>
           <p:cNvCxnSpPr>
             <a:cxnSpLocks/>
-            <a:stCxn id="8" idx="2"/>
+            <a:stCxn id="8" idx="3"/>
           </p:cNvCxnSpPr>
           <p:nvPr/>
         </p:nvCxnSpPr>
         <p:spPr>
           <a:xfrm>
-            <a:off x="7034213" y="2432050"/>
-            <a:ext cx="0" cy="387350"/>
-          </a:xfrm>
-          <a:prstGeom prst="straightConnector1">
-            <a:avLst/>
-          </a:prstGeom>
-          <a:ln w="38100">
-            <a:solidFill>
-              <a:schemeClr val="accent5">
-                <a:lumMod val="60000"/>
-                <a:lumOff val="40000"/>
-              </a:schemeClr>
-            </a:solidFill>
-            <a:headEnd type="triangle" w="med" len="med"/>
-            <a:tailEnd type="triangle" w="med" len="med"/>
-          </a:ln>
-        </p:spPr>
-        <p:style>
-          <a:lnRef idx="1">
-            <a:schemeClr val="accent1"/>
-          </a:lnRef>
-          <a:fillRef idx="0">
-            <a:schemeClr val="accent1"/>
-          </a:fillRef>
-          <a:effectRef idx="0">
-            <a:schemeClr val="accent1"/>
-          </a:effectRef>
-          <a:fontRef idx="minor">
-            <a:schemeClr val="tx1"/>
-          </a:fontRef>
-        </p:style>
-      </p:cxnSp>
-      <p:cxnSp>
-        <p:nvCxnSpPr>
-          <p:cNvPr id="56" name="Straight Arrow Connector 55">
-            <a:extLst>
-              <a:ext uri="{FF2B5EF4-FFF2-40B4-BE49-F238E27FC236}">
-                <a16:creationId xmlns:a16="http://schemas.microsoft.com/office/drawing/2014/main" id="{1C04F207-21C1-45A4-BF32-F8572EA4EBA9}"/>
-              </a:ext>
-            </a:extLst>
-          </p:cNvPr>
-          <p:cNvCxnSpPr>
-            <a:cxnSpLocks/>
-          </p:cNvCxnSpPr>
-          <p:nvPr/>
-        </p:nvCxnSpPr>
-        <p:spPr>
-          <a:xfrm>
-            <a:off x="8122442" y="5010150"/>
-            <a:ext cx="0" cy="482600"/>
+            <a:off x="11110894" y="3306210"/>
+            <a:ext cx="515566" cy="0"/>
           </a:xfrm>
           <a:prstGeom prst="straightConnector1">
             <a:avLst/>
@@ -4638,37 +4534,188 @@
           </a:fontRef>
         </p:style>
       </p:cxnSp>
+      <p:sp>
+        <p:nvSpPr>
+          <p:cNvPr id="67" name="TextBox 66">
+            <a:extLst>
+              <a:ext uri="{FF2B5EF4-FFF2-40B4-BE49-F238E27FC236}">
+                <a16:creationId xmlns:a16="http://schemas.microsoft.com/office/drawing/2014/main" id="{8D39B497-F66B-4C05-BA74-AC055DB3845F}"/>
+              </a:ext>
+            </a:extLst>
+          </p:cNvPr>
+          <p:cNvSpPr txBox="1"/>
+          <p:nvPr/>
+        </p:nvSpPr>
+        <p:spPr>
+          <a:xfrm rot="16200000">
+            <a:off x="11183860" y="2951370"/>
+            <a:ext cx="1338893" cy="523220"/>
+          </a:xfrm>
+          <a:prstGeom prst="rect">
+            <a:avLst/>
+          </a:prstGeom>
+          <a:noFill/>
+        </p:spPr>
+        <p:txBody>
+          <a:bodyPr wrap="none" rtlCol="0">
+            <a:spAutoFit/>
+          </a:bodyPr>
+          <a:lstStyle/>
+          <a:p>
+            <a:r>
+              <a:rPr lang="en-US" sz="1400" dirty="0"/>
+              <a:t>To CSB of other </a:t>
+            </a:r>
+          </a:p>
+          <a:p>
+            <a:r>
+              <a:rPr lang="en-US" sz="1400" dirty="0"/>
+              <a:t>Cloud Platforms</a:t>
+            </a:r>
+          </a:p>
+        </p:txBody>
+      </p:sp>
+      <p:sp>
+        <p:nvSpPr>
+          <p:cNvPr id="68" name="TextBox 67">
+            <a:extLst>
+              <a:ext uri="{FF2B5EF4-FFF2-40B4-BE49-F238E27FC236}">
+                <a16:creationId xmlns:a16="http://schemas.microsoft.com/office/drawing/2014/main" id="{01FE15C1-75BC-4F47-95E2-9A2D802898DB}"/>
+              </a:ext>
+            </a:extLst>
+          </p:cNvPr>
+          <p:cNvSpPr txBox="1"/>
+          <p:nvPr/>
+        </p:nvSpPr>
+        <p:spPr>
+          <a:xfrm rot="16200000">
+            <a:off x="11190875" y="4278913"/>
+            <a:ext cx="1354923" cy="523220"/>
+          </a:xfrm>
+          <a:prstGeom prst="rect">
+            <a:avLst/>
+          </a:prstGeom>
+          <a:noFill/>
+        </p:spPr>
+        <p:txBody>
+          <a:bodyPr wrap="none" rtlCol="0">
+            <a:spAutoFit/>
+          </a:bodyPr>
+          <a:lstStyle/>
+          <a:p>
+            <a:r>
+              <a:rPr lang="en-US" sz="1400" dirty="0"/>
+              <a:t>To CRB of other </a:t>
+            </a:r>
+          </a:p>
+          <a:p>
+            <a:r>
+              <a:rPr lang="en-US" sz="1400" dirty="0"/>
+              <a:t>Cloud Platforms</a:t>
+            </a:r>
+          </a:p>
+        </p:txBody>
+      </p:sp>
+      <p:sp>
+        <p:nvSpPr>
+          <p:cNvPr id="33" name="Rectangle 32">
+            <a:extLst>
+              <a:ext uri="{FF2B5EF4-FFF2-40B4-BE49-F238E27FC236}">
+                <a16:creationId xmlns:a16="http://schemas.microsoft.com/office/drawing/2014/main" id="{09827EC2-0FC8-453D-A983-E1FC5921F2CB}"/>
+              </a:ext>
+            </a:extLst>
+          </p:cNvPr>
+          <p:cNvSpPr/>
+          <p:nvPr/>
+        </p:nvSpPr>
+        <p:spPr>
+          <a:xfrm>
+            <a:off x="3456624" y="4788617"/>
+            <a:ext cx="2086510" cy="850900"/>
+          </a:xfrm>
+          <a:prstGeom prst="rect">
+            <a:avLst/>
+          </a:prstGeom>
+          <a:solidFill>
+            <a:schemeClr val="accent1">
+              <a:lumMod val="60000"/>
+              <a:lumOff val="40000"/>
+            </a:schemeClr>
+          </a:solidFill>
+        </p:spPr>
+        <p:style>
+          <a:lnRef idx="2">
+            <a:schemeClr val="accent1">
+              <a:shade val="50000"/>
+            </a:schemeClr>
+          </a:lnRef>
+          <a:fillRef idx="1">
+            <a:schemeClr val="accent1"/>
+          </a:fillRef>
+          <a:effectRef idx="0">
+            <a:schemeClr val="accent1"/>
+          </a:effectRef>
+          <a:fontRef idx="minor">
+            <a:schemeClr val="lt1"/>
+          </a:fontRef>
+        </p:style>
+        <p:txBody>
+          <a:bodyPr rtlCol="0" anchor="ctr"/>
+          <a:lstStyle/>
+          <a:p>
+            <a:pPr algn="ctr"/>
+            <a:r>
+              <a:rPr lang="en-US" b="1" dirty="0">
+                <a:solidFill>
+                  <a:schemeClr val="tx1"/>
+                </a:solidFill>
+              </a:rPr>
+              <a:t>Virtual Infrastructure Layer</a:t>
+            </a:r>
+          </a:p>
+          <a:p>
+            <a:pPr algn="ctr"/>
+            <a:r>
+              <a:rPr lang="en-US" sz="1400" dirty="0">
+                <a:solidFill>
+                  <a:schemeClr val="tx1"/>
+                </a:solidFill>
+              </a:rPr>
+              <a:t>(VM, Cont. in VM and BM)</a:t>
+            </a:r>
+          </a:p>
+        </p:txBody>
+      </p:sp>
       <p:cxnSp>
         <p:nvCxnSpPr>
-          <p:cNvPr id="57" name="Straight Arrow Connector 56">
-            <a:extLst>
-              <a:ext uri="{FF2B5EF4-FFF2-40B4-BE49-F238E27FC236}">
-                <a16:creationId xmlns:a16="http://schemas.microsoft.com/office/drawing/2014/main" id="{C8D7D85E-7E0A-4ED7-96D8-6E2B39401B6D}"/>
+          <p:cNvPr id="35" name="Straight Arrow Connector 34">
+            <a:extLst>
+              <a:ext uri="{FF2B5EF4-FFF2-40B4-BE49-F238E27FC236}">
+                <a16:creationId xmlns:a16="http://schemas.microsoft.com/office/drawing/2014/main" id="{2F9A3EF2-819B-43A0-B934-D7C443AFB79F}"/>
               </a:ext>
             </a:extLst>
           </p:cNvPr>
           <p:cNvCxnSpPr>
             <a:cxnSpLocks/>
-            <a:stCxn id="7" idx="3"/>
+            <a:stCxn id="33" idx="2"/>
           </p:cNvCxnSpPr>
           <p:nvPr/>
         </p:nvCxnSpPr>
         <p:spPr>
           <a:xfrm>
-            <a:off x="9979812" y="4584700"/>
-            <a:ext cx="688188" cy="0"/>
+            <a:off x="4499879" y="5639517"/>
+            <a:ext cx="0" cy="214233"/>
           </a:xfrm>
           <a:prstGeom prst="straightConnector1">
             <a:avLst/>
           </a:prstGeom>
           <a:ln w="38100">
             <a:solidFill>
-              <a:schemeClr val="tx2">
-                <a:lumMod val="60000"/>
-                <a:lumOff val="40000"/>
+              <a:schemeClr val="accent1">
+                <a:lumMod val="75000"/>
               </a:schemeClr>
             </a:solidFill>
-            <a:headEnd type="triangle" w="med" len="med"/>
+            <a:headEnd type="none" w="med" len="med"/>
             <a:tailEnd type="triangle" w="med" len="med"/>
           </a:ln>
         </p:spPr>
@@ -4689,35 +4736,36 @@
       </p:cxnSp>
       <p:cxnSp>
         <p:nvCxnSpPr>
-          <p:cNvPr id="58" name="Straight Arrow Connector 57">
-            <a:extLst>
-              <a:ext uri="{FF2B5EF4-FFF2-40B4-BE49-F238E27FC236}">
-                <a16:creationId xmlns:a16="http://schemas.microsoft.com/office/drawing/2014/main" id="{5A7F895A-B909-4846-9BC5-77C0D1C934FF}"/>
+          <p:cNvPr id="41" name="Straight Arrow Connector 40">
+            <a:extLst>
+              <a:ext uri="{FF2B5EF4-FFF2-40B4-BE49-F238E27FC236}">
+                <a16:creationId xmlns:a16="http://schemas.microsoft.com/office/drawing/2014/main" id="{A8961D61-5050-4D8F-9B0B-073B7CDADDBE}"/>
               </a:ext>
             </a:extLst>
           </p:cNvPr>
           <p:cNvCxnSpPr>
             <a:cxnSpLocks/>
-            <a:stCxn id="8" idx="3"/>
+            <a:stCxn id="6" idx="2"/>
+            <a:endCxn id="5" idx="0"/>
           </p:cNvCxnSpPr>
           <p:nvPr/>
         </p:nvCxnSpPr>
         <p:spPr>
           <a:xfrm>
-            <a:off x="9747250" y="2006600"/>
-            <a:ext cx="920750" cy="0"/>
+            <a:off x="6406771" y="2399177"/>
+            <a:ext cx="0" cy="1020364"/>
           </a:xfrm>
           <a:prstGeom prst="straightConnector1">
             <a:avLst/>
           </a:prstGeom>
-          <a:ln w="38100">
+          <a:ln w="57150">
             <a:solidFill>
-              <a:schemeClr val="tx2">
+              <a:schemeClr val="accent5">
                 <a:lumMod val="60000"/>
                 <a:lumOff val="40000"/>
               </a:schemeClr>
             </a:solidFill>
-            <a:headEnd type="triangle" w="med" len="med"/>
+            <a:headEnd type="none" w="med" len="med"/>
             <a:tailEnd type="triangle" w="med" len="med"/>
           </a:ln>
         </p:spPr>
@@ -4738,10 +4786,10 @@
       </p:cxnSp>
       <p:sp>
         <p:nvSpPr>
-          <p:cNvPr id="67" name="TextBox 66">
-            <a:extLst>
-              <a:ext uri="{FF2B5EF4-FFF2-40B4-BE49-F238E27FC236}">
-                <a16:creationId xmlns:a16="http://schemas.microsoft.com/office/drawing/2014/main" id="{8D39B497-F66B-4C05-BA74-AC055DB3845F}"/>
+          <p:cNvPr id="37" name="TextBox 36">
+            <a:extLst>
+              <a:ext uri="{FF2B5EF4-FFF2-40B4-BE49-F238E27FC236}">
+                <a16:creationId xmlns:a16="http://schemas.microsoft.com/office/drawing/2014/main" id="{36296457-BC86-428B-A7F7-242C9B550F19}"/>
               </a:ext>
             </a:extLst>
           </p:cNvPr>
@@ -4750,8 +4798,8 @@
         </p:nvSpPr>
         <p:spPr>
           <a:xfrm>
-            <a:off x="10235571" y="2054880"/>
-            <a:ext cx="1338893" cy="523220"/>
+            <a:off x="909403" y="1108005"/>
+            <a:ext cx="1743875" cy="369332"/>
           </a:xfrm>
           <a:prstGeom prst="rect">
             <a:avLst/>
@@ -4765,699 +4813,36 @@
           <a:lstStyle/>
           <a:p>
             <a:r>
-              <a:rPr lang="en-US" sz="1400" dirty="0"/>
-              <a:t>To CSB of other </a:t>
-            </a:r>
-          </a:p>
-          <a:p>
-            <a:r>
-              <a:rPr lang="en-US" sz="1400" dirty="0"/>
-              <a:t>Cloud Platforms</a:t>
-            </a:r>
-          </a:p>
-        </p:txBody>
-      </p:sp>
-      <p:sp>
-        <p:nvSpPr>
-          <p:cNvPr id="68" name="TextBox 67">
-            <a:extLst>
-              <a:ext uri="{FF2B5EF4-FFF2-40B4-BE49-F238E27FC236}">
-                <a16:creationId xmlns:a16="http://schemas.microsoft.com/office/drawing/2014/main" id="{01FE15C1-75BC-4F47-95E2-9A2D802898DB}"/>
-              </a:ext>
-            </a:extLst>
-          </p:cNvPr>
-          <p:cNvSpPr txBox="1"/>
+              <a:rPr lang="en-US" dirty="0"/>
+              <a:t>* Strictly layered</a:t>
+            </a:r>
+          </a:p>
+        </p:txBody>
+      </p:sp>
+      <p:cxnSp>
+        <p:nvCxnSpPr>
+          <p:cNvPr id="39" name="Straight Connector 38">
+            <a:extLst>
+              <a:ext uri="{FF2B5EF4-FFF2-40B4-BE49-F238E27FC236}">
+                <a16:creationId xmlns:a16="http://schemas.microsoft.com/office/drawing/2014/main" id="{F9FB6994-80A2-468C-B5C2-76DD66BB9575}"/>
+              </a:ext>
+            </a:extLst>
+          </p:cNvPr>
+          <p:cNvCxnSpPr>
+            <a:cxnSpLocks/>
+            <a:stCxn id="11" idx="0"/>
+            <a:endCxn id="37" idx="1"/>
+          </p:cNvCxnSpPr>
           <p:nvPr/>
-        </p:nvSpPr>
-        <p:spPr>
-          <a:xfrm>
-            <a:off x="10174758" y="4632979"/>
-            <a:ext cx="1354923" cy="523220"/>
-          </a:xfrm>
-          <a:prstGeom prst="rect">
+        </p:nvCxnSpPr>
+        <p:spPr>
+          <a:xfrm flipV="1">
+            <a:off x="649920" y="1292671"/>
+            <a:ext cx="259483" cy="305171"/>
+          </a:xfrm>
+          <a:prstGeom prst="line">
             <a:avLst/>
           </a:prstGeom>
-          <a:noFill/>
-        </p:spPr>
-        <p:txBody>
-          <a:bodyPr wrap="none" rtlCol="0">
-            <a:spAutoFit/>
-          </a:bodyPr>
-          <a:lstStyle/>
-          <a:p>
-            <a:r>
-              <a:rPr lang="en-US" sz="1400" dirty="0"/>
-              <a:t>To CRB of other </a:t>
-            </a:r>
-          </a:p>
-          <a:p>
-            <a:r>
-              <a:rPr lang="en-US" sz="1400" dirty="0"/>
-              <a:t>Cloud Platforms</a:t>
-            </a:r>
-          </a:p>
-        </p:txBody>
-      </p:sp>
-      <p:sp>
-        <p:nvSpPr>
-          <p:cNvPr id="2" name="Rectangle 1">
-            <a:extLst>
-              <a:ext uri="{FF2B5EF4-FFF2-40B4-BE49-F238E27FC236}">
-                <a16:creationId xmlns:a16="http://schemas.microsoft.com/office/drawing/2014/main" id="{078DD348-C173-46B8-8CB6-AB1B3A738E5A}"/>
-              </a:ext>
-            </a:extLst>
-          </p:cNvPr>
-          <p:cNvSpPr/>
-          <p:nvPr/>
-        </p:nvSpPr>
-        <p:spPr>
-          <a:xfrm>
-            <a:off x="339723" y="5492750"/>
-            <a:ext cx="766312" cy="756565"/>
-          </a:xfrm>
-          <a:prstGeom prst="rect">
-            <a:avLst/>
-          </a:prstGeom>
-          <a:solidFill>
-            <a:schemeClr val="bg2">
-              <a:alpha val="24000"/>
-            </a:schemeClr>
-          </a:solidFill>
-        </p:spPr>
-        <p:style>
-          <a:lnRef idx="2">
-            <a:schemeClr val="accent1">
-              <a:shade val="50000"/>
-            </a:schemeClr>
-          </a:lnRef>
-          <a:fillRef idx="1">
-            <a:schemeClr val="accent1"/>
-          </a:fillRef>
-          <a:effectRef idx="0">
-            <a:schemeClr val="accent1"/>
-          </a:effectRef>
-          <a:fontRef idx="minor">
-            <a:schemeClr val="lt1"/>
-          </a:fontRef>
-        </p:style>
-        <p:txBody>
-          <a:bodyPr rtlCol="0" anchor="ctr"/>
-          <a:lstStyle/>
-          <a:p>
-            <a:pPr algn="ctr"/>
-            <a:endParaRPr lang="en-US"/>
-          </a:p>
-        </p:txBody>
-      </p:sp>
-      <p:sp>
-        <p:nvSpPr>
-          <p:cNvPr id="33" name="Rectangle 32">
-            <a:extLst>
-              <a:ext uri="{FF2B5EF4-FFF2-40B4-BE49-F238E27FC236}">
-                <a16:creationId xmlns:a16="http://schemas.microsoft.com/office/drawing/2014/main" id="{4973461E-AE1B-4703-A426-D51E8E876876}"/>
-              </a:ext>
-            </a:extLst>
-          </p:cNvPr>
-          <p:cNvSpPr/>
-          <p:nvPr/>
-        </p:nvSpPr>
-        <p:spPr>
-          <a:xfrm>
-            <a:off x="347052" y="4293432"/>
-            <a:ext cx="766312" cy="756565"/>
-          </a:xfrm>
-          <a:prstGeom prst="rect">
-            <a:avLst/>
-          </a:prstGeom>
-          <a:solidFill>
-            <a:schemeClr val="bg2">
-              <a:alpha val="24000"/>
-            </a:schemeClr>
-          </a:solidFill>
-        </p:spPr>
-        <p:style>
-          <a:lnRef idx="2">
-            <a:schemeClr val="accent1">
-              <a:shade val="50000"/>
-            </a:schemeClr>
-          </a:lnRef>
-          <a:fillRef idx="1">
-            <a:schemeClr val="accent1"/>
-          </a:fillRef>
-          <a:effectRef idx="0">
-            <a:schemeClr val="accent1"/>
-          </a:effectRef>
-          <a:fontRef idx="minor">
-            <a:schemeClr val="lt1"/>
-          </a:fontRef>
-        </p:style>
-        <p:txBody>
-          <a:bodyPr rtlCol="0" anchor="ctr"/>
-          <a:lstStyle/>
-          <a:p>
-            <a:pPr algn="ctr"/>
-            <a:endParaRPr lang="en-US"/>
-          </a:p>
-        </p:txBody>
-      </p:sp>
-      <p:sp>
-        <p:nvSpPr>
-          <p:cNvPr id="35" name="Rectangle 34">
-            <a:extLst>
-              <a:ext uri="{FF2B5EF4-FFF2-40B4-BE49-F238E27FC236}">
-                <a16:creationId xmlns:a16="http://schemas.microsoft.com/office/drawing/2014/main" id="{BAA71B6E-8F02-4EA6-8573-47EC732A6D11}"/>
-              </a:ext>
-            </a:extLst>
-          </p:cNvPr>
-          <p:cNvSpPr/>
-          <p:nvPr/>
-        </p:nvSpPr>
-        <p:spPr>
-          <a:xfrm>
-            <a:off x="347052" y="2917367"/>
-            <a:ext cx="766312" cy="756565"/>
-          </a:xfrm>
-          <a:prstGeom prst="rect">
-            <a:avLst/>
-          </a:prstGeom>
-          <a:solidFill>
-            <a:schemeClr val="bg2">
-              <a:alpha val="24000"/>
-            </a:schemeClr>
-          </a:solidFill>
-        </p:spPr>
-        <p:style>
-          <a:lnRef idx="2">
-            <a:schemeClr val="accent1">
-              <a:shade val="50000"/>
-            </a:schemeClr>
-          </a:lnRef>
-          <a:fillRef idx="1">
-            <a:schemeClr val="accent1"/>
-          </a:fillRef>
-          <a:effectRef idx="0">
-            <a:schemeClr val="accent1"/>
-          </a:effectRef>
-          <a:fontRef idx="minor">
-            <a:schemeClr val="lt1"/>
-          </a:fontRef>
-        </p:style>
-        <p:txBody>
-          <a:bodyPr rtlCol="0" anchor="ctr"/>
-          <a:lstStyle/>
-          <a:p>
-            <a:pPr algn="ctr"/>
-            <a:endParaRPr lang="en-US"/>
-          </a:p>
-        </p:txBody>
-      </p:sp>
-      <p:sp>
-        <p:nvSpPr>
-          <p:cNvPr id="36" name="Rectangle 35">
-            <a:extLst>
-              <a:ext uri="{FF2B5EF4-FFF2-40B4-BE49-F238E27FC236}">
-                <a16:creationId xmlns:a16="http://schemas.microsoft.com/office/drawing/2014/main" id="{AF17CB31-A8A8-413C-95FA-B49D9A784649}"/>
-              </a:ext>
-            </a:extLst>
-          </p:cNvPr>
-          <p:cNvSpPr/>
-          <p:nvPr/>
-        </p:nvSpPr>
-        <p:spPr>
-          <a:xfrm>
-            <a:off x="350195" y="1629676"/>
-            <a:ext cx="766312" cy="756565"/>
-          </a:xfrm>
-          <a:prstGeom prst="rect">
-            <a:avLst/>
-          </a:prstGeom>
-          <a:solidFill>
-            <a:schemeClr val="bg2">
-              <a:alpha val="24000"/>
-            </a:schemeClr>
-          </a:solidFill>
-        </p:spPr>
-        <p:style>
-          <a:lnRef idx="2">
-            <a:schemeClr val="accent1">
-              <a:shade val="50000"/>
-            </a:schemeClr>
-          </a:lnRef>
-          <a:fillRef idx="1">
-            <a:schemeClr val="accent1"/>
-          </a:fillRef>
-          <a:effectRef idx="0">
-            <a:schemeClr val="accent1"/>
-          </a:effectRef>
-          <a:fontRef idx="minor">
-            <a:schemeClr val="lt1"/>
-          </a:fontRef>
-        </p:style>
-        <p:txBody>
-          <a:bodyPr rtlCol="0" anchor="ctr"/>
-          <a:lstStyle/>
-          <a:p>
-            <a:pPr algn="ctr"/>
-            <a:endParaRPr lang="en-US"/>
-          </a:p>
-        </p:txBody>
-      </p:sp>
-      <p:sp>
-        <p:nvSpPr>
-          <p:cNvPr id="37" name="Rectangle 36">
-            <a:extLst>
-              <a:ext uri="{FF2B5EF4-FFF2-40B4-BE49-F238E27FC236}">
-                <a16:creationId xmlns:a16="http://schemas.microsoft.com/office/drawing/2014/main" id="{2578FB10-E0C1-451B-ABA8-62ADE8B8BE8B}"/>
-              </a:ext>
-            </a:extLst>
-          </p:cNvPr>
-          <p:cNvSpPr/>
-          <p:nvPr/>
-        </p:nvSpPr>
-        <p:spPr>
-          <a:xfrm>
-            <a:off x="1650740" y="1630469"/>
-            <a:ext cx="451099" cy="756565"/>
-          </a:xfrm>
-          <a:prstGeom prst="rect">
-            <a:avLst/>
-          </a:prstGeom>
-          <a:solidFill>
-            <a:schemeClr val="bg2">
-              <a:alpha val="24000"/>
-            </a:schemeClr>
-          </a:solidFill>
-        </p:spPr>
-        <p:style>
-          <a:lnRef idx="2">
-            <a:schemeClr val="accent1">
-              <a:shade val="50000"/>
-            </a:schemeClr>
-          </a:lnRef>
-          <a:fillRef idx="1">
-            <a:schemeClr val="accent1"/>
-          </a:fillRef>
-          <a:effectRef idx="0">
-            <a:schemeClr val="accent1"/>
-          </a:effectRef>
-          <a:fontRef idx="minor">
-            <a:schemeClr val="lt1"/>
-          </a:fontRef>
-        </p:style>
-        <p:txBody>
-          <a:bodyPr rtlCol="0" anchor="ctr"/>
-          <a:lstStyle/>
-          <a:p>
-            <a:pPr algn="ctr"/>
-            <a:endParaRPr lang="en-US"/>
-          </a:p>
-        </p:txBody>
-      </p:sp>
-      <p:sp>
-        <p:nvSpPr>
-          <p:cNvPr id="38" name="Rectangle 37">
-            <a:extLst>
-              <a:ext uri="{FF2B5EF4-FFF2-40B4-BE49-F238E27FC236}">
-                <a16:creationId xmlns:a16="http://schemas.microsoft.com/office/drawing/2014/main" id="{35A982CF-59F7-4381-86E8-B3E74171C8A8}"/>
-              </a:ext>
-            </a:extLst>
-          </p:cNvPr>
-          <p:cNvSpPr/>
-          <p:nvPr/>
-        </p:nvSpPr>
-        <p:spPr>
-          <a:xfrm>
-            <a:off x="1658006" y="2917366"/>
-            <a:ext cx="451099" cy="756565"/>
-          </a:xfrm>
-          <a:prstGeom prst="rect">
-            <a:avLst/>
-          </a:prstGeom>
-          <a:solidFill>
-            <a:schemeClr val="bg2">
-              <a:alpha val="24000"/>
-            </a:schemeClr>
-          </a:solidFill>
-        </p:spPr>
-        <p:style>
-          <a:lnRef idx="2">
-            <a:schemeClr val="accent1">
-              <a:shade val="50000"/>
-            </a:schemeClr>
-          </a:lnRef>
-          <a:fillRef idx="1">
-            <a:schemeClr val="accent1"/>
-          </a:fillRef>
-          <a:effectRef idx="0">
-            <a:schemeClr val="accent1"/>
-          </a:effectRef>
-          <a:fontRef idx="minor">
-            <a:schemeClr val="lt1"/>
-          </a:fontRef>
-        </p:style>
-        <p:txBody>
-          <a:bodyPr rtlCol="0" anchor="ctr"/>
-          <a:lstStyle/>
-          <a:p>
-            <a:pPr algn="ctr"/>
-            <a:endParaRPr lang="en-US"/>
-          </a:p>
-        </p:txBody>
-      </p:sp>
-      <p:sp>
-        <p:nvSpPr>
-          <p:cNvPr id="39" name="Rectangle 38">
-            <a:extLst>
-              <a:ext uri="{FF2B5EF4-FFF2-40B4-BE49-F238E27FC236}">
-                <a16:creationId xmlns:a16="http://schemas.microsoft.com/office/drawing/2014/main" id="{BD70F7C6-35C6-4A3D-8F2F-9406DB6F9BDB}"/>
-              </a:ext>
-            </a:extLst>
-          </p:cNvPr>
-          <p:cNvSpPr/>
-          <p:nvPr/>
-        </p:nvSpPr>
-        <p:spPr>
-          <a:xfrm>
-            <a:off x="1658006" y="4293431"/>
-            <a:ext cx="451099" cy="756565"/>
-          </a:xfrm>
-          <a:prstGeom prst="rect">
-            <a:avLst/>
-          </a:prstGeom>
-          <a:solidFill>
-            <a:schemeClr val="bg2">
-              <a:alpha val="24000"/>
-            </a:schemeClr>
-          </a:solidFill>
-        </p:spPr>
-        <p:style>
-          <a:lnRef idx="2">
-            <a:schemeClr val="accent1">
-              <a:shade val="50000"/>
-            </a:schemeClr>
-          </a:lnRef>
-          <a:fillRef idx="1">
-            <a:schemeClr val="accent1"/>
-          </a:fillRef>
-          <a:effectRef idx="0">
-            <a:schemeClr val="accent1"/>
-          </a:effectRef>
-          <a:fontRef idx="minor">
-            <a:schemeClr val="lt1"/>
-          </a:fontRef>
-        </p:style>
-        <p:txBody>
-          <a:bodyPr rtlCol="0" anchor="ctr"/>
-          <a:lstStyle/>
-          <a:p>
-            <a:pPr algn="ctr"/>
-            <a:endParaRPr lang="en-US"/>
-          </a:p>
-        </p:txBody>
-      </p:sp>
-      <p:sp>
-        <p:nvSpPr>
-          <p:cNvPr id="40" name="Rectangle 39">
-            <a:extLst>
-              <a:ext uri="{FF2B5EF4-FFF2-40B4-BE49-F238E27FC236}">
-                <a16:creationId xmlns:a16="http://schemas.microsoft.com/office/drawing/2014/main" id="{836BF2D9-1F8B-45B7-9ACB-B10467ECA300}"/>
-              </a:ext>
-            </a:extLst>
-          </p:cNvPr>
-          <p:cNvSpPr/>
-          <p:nvPr/>
-        </p:nvSpPr>
-        <p:spPr>
-          <a:xfrm>
-            <a:off x="1645985" y="5492750"/>
-            <a:ext cx="451099" cy="756565"/>
-          </a:xfrm>
-          <a:prstGeom prst="rect">
-            <a:avLst/>
-          </a:prstGeom>
-          <a:solidFill>
-            <a:schemeClr val="bg2">
-              <a:alpha val="24000"/>
-            </a:schemeClr>
-          </a:solidFill>
-        </p:spPr>
-        <p:style>
-          <a:lnRef idx="2">
-            <a:schemeClr val="accent1">
-              <a:shade val="50000"/>
-            </a:schemeClr>
-          </a:lnRef>
-          <a:fillRef idx="1">
-            <a:schemeClr val="accent1"/>
-          </a:fillRef>
-          <a:effectRef idx="0">
-            <a:schemeClr val="accent1"/>
-          </a:effectRef>
-          <a:fontRef idx="minor">
-            <a:schemeClr val="lt1"/>
-          </a:fontRef>
-        </p:style>
-        <p:txBody>
-          <a:bodyPr rtlCol="0" anchor="ctr"/>
-          <a:lstStyle/>
-          <a:p>
-            <a:pPr algn="ctr"/>
-            <a:endParaRPr lang="en-US"/>
-          </a:p>
-        </p:txBody>
-      </p:sp>
-      <p:sp>
-        <p:nvSpPr>
-          <p:cNvPr id="44" name="Rectangle 43">
-            <a:extLst>
-              <a:ext uri="{FF2B5EF4-FFF2-40B4-BE49-F238E27FC236}">
-                <a16:creationId xmlns:a16="http://schemas.microsoft.com/office/drawing/2014/main" id="{6AF3DF03-540F-4284-9793-4FDFBB949172}"/>
-              </a:ext>
-            </a:extLst>
-          </p:cNvPr>
-          <p:cNvSpPr/>
-          <p:nvPr/>
-        </p:nvSpPr>
-        <p:spPr>
-          <a:xfrm>
-            <a:off x="2577508" y="2917366"/>
-            <a:ext cx="451099" cy="756565"/>
-          </a:xfrm>
-          <a:prstGeom prst="rect">
-            <a:avLst/>
-          </a:prstGeom>
-          <a:solidFill>
-            <a:schemeClr val="bg2">
-              <a:alpha val="24000"/>
-            </a:schemeClr>
-          </a:solidFill>
-        </p:spPr>
-        <p:style>
-          <a:lnRef idx="2">
-            <a:schemeClr val="accent1">
-              <a:shade val="50000"/>
-            </a:schemeClr>
-          </a:lnRef>
-          <a:fillRef idx="1">
-            <a:schemeClr val="accent1"/>
-          </a:fillRef>
-          <a:effectRef idx="0">
-            <a:schemeClr val="accent1"/>
-          </a:effectRef>
-          <a:fontRef idx="minor">
-            <a:schemeClr val="lt1"/>
-          </a:fontRef>
-        </p:style>
-        <p:txBody>
-          <a:bodyPr rtlCol="0" anchor="ctr"/>
-          <a:lstStyle/>
-          <a:p>
-            <a:pPr algn="ctr"/>
-            <a:endParaRPr lang="en-US"/>
-          </a:p>
-        </p:txBody>
-      </p:sp>
-      <p:sp>
-        <p:nvSpPr>
-          <p:cNvPr id="45" name="Rectangle 44">
-            <a:extLst>
-              <a:ext uri="{FF2B5EF4-FFF2-40B4-BE49-F238E27FC236}">
-                <a16:creationId xmlns:a16="http://schemas.microsoft.com/office/drawing/2014/main" id="{EA817699-722A-486E-BC8F-082469777A47}"/>
-              </a:ext>
-            </a:extLst>
-          </p:cNvPr>
-          <p:cNvSpPr/>
-          <p:nvPr/>
-        </p:nvSpPr>
-        <p:spPr>
-          <a:xfrm>
-            <a:off x="2577508" y="4293431"/>
-            <a:ext cx="451099" cy="756565"/>
-          </a:xfrm>
-          <a:prstGeom prst="rect">
-            <a:avLst/>
-          </a:prstGeom>
-          <a:solidFill>
-            <a:schemeClr val="bg2">
-              <a:alpha val="24000"/>
-            </a:schemeClr>
-          </a:solidFill>
-        </p:spPr>
-        <p:style>
-          <a:lnRef idx="2">
-            <a:schemeClr val="accent1">
-              <a:shade val="50000"/>
-            </a:schemeClr>
-          </a:lnRef>
-          <a:fillRef idx="1">
-            <a:schemeClr val="accent1"/>
-          </a:fillRef>
-          <a:effectRef idx="0">
-            <a:schemeClr val="accent1"/>
-          </a:effectRef>
-          <a:fontRef idx="minor">
-            <a:schemeClr val="lt1"/>
-          </a:fontRef>
-        </p:style>
-        <p:txBody>
-          <a:bodyPr rtlCol="0" anchor="ctr"/>
-          <a:lstStyle/>
-          <a:p>
-            <a:pPr algn="ctr"/>
-            <a:endParaRPr lang="en-US"/>
-          </a:p>
-        </p:txBody>
-      </p:sp>
-      <p:sp>
-        <p:nvSpPr>
-          <p:cNvPr id="47" name="Rectangle 46">
-            <a:extLst>
-              <a:ext uri="{FF2B5EF4-FFF2-40B4-BE49-F238E27FC236}">
-                <a16:creationId xmlns:a16="http://schemas.microsoft.com/office/drawing/2014/main" id="{0160F97E-B302-45E7-8D81-5E565EC406C6}"/>
-              </a:ext>
-            </a:extLst>
-          </p:cNvPr>
-          <p:cNvSpPr/>
-          <p:nvPr/>
-        </p:nvSpPr>
-        <p:spPr>
-          <a:xfrm>
-            <a:off x="2584190" y="5492750"/>
-            <a:ext cx="451099" cy="756565"/>
-          </a:xfrm>
-          <a:prstGeom prst="rect">
-            <a:avLst/>
-          </a:prstGeom>
-          <a:solidFill>
-            <a:schemeClr val="bg2">
-              <a:alpha val="24000"/>
-            </a:schemeClr>
-          </a:solidFill>
-        </p:spPr>
-        <p:style>
-          <a:lnRef idx="2">
-            <a:schemeClr val="accent1">
-              <a:shade val="50000"/>
-            </a:schemeClr>
-          </a:lnRef>
-          <a:fillRef idx="1">
-            <a:schemeClr val="accent1"/>
-          </a:fillRef>
-          <a:effectRef idx="0">
-            <a:schemeClr val="accent1"/>
-          </a:effectRef>
-          <a:fontRef idx="minor">
-            <a:schemeClr val="lt1"/>
-          </a:fontRef>
-        </p:style>
-        <p:txBody>
-          <a:bodyPr rtlCol="0" anchor="ctr"/>
-          <a:lstStyle/>
-          <a:p>
-            <a:pPr algn="ctr"/>
-            <a:endParaRPr lang="en-US"/>
-          </a:p>
-        </p:txBody>
-      </p:sp>
-      <p:sp>
-        <p:nvSpPr>
-          <p:cNvPr id="48" name="Rectangle 47">
-            <a:extLst>
-              <a:ext uri="{FF2B5EF4-FFF2-40B4-BE49-F238E27FC236}">
-                <a16:creationId xmlns:a16="http://schemas.microsoft.com/office/drawing/2014/main" id="{F6D2718E-5088-402E-88A1-BE7993925BCC}"/>
-              </a:ext>
-            </a:extLst>
-          </p:cNvPr>
-          <p:cNvSpPr/>
-          <p:nvPr/>
-        </p:nvSpPr>
-        <p:spPr>
-          <a:xfrm>
-            <a:off x="2584422" y="1629676"/>
-            <a:ext cx="451099" cy="756565"/>
-          </a:xfrm>
-          <a:prstGeom prst="rect">
-            <a:avLst/>
-          </a:prstGeom>
-          <a:solidFill>
-            <a:schemeClr val="bg2">
-              <a:alpha val="24000"/>
-            </a:schemeClr>
-          </a:solidFill>
-        </p:spPr>
-        <p:style>
-          <a:lnRef idx="2">
-            <a:schemeClr val="accent1">
-              <a:shade val="50000"/>
-            </a:schemeClr>
-          </a:lnRef>
-          <a:fillRef idx="1">
-            <a:schemeClr val="accent1"/>
-          </a:fillRef>
-          <a:effectRef idx="0">
-            <a:schemeClr val="accent1"/>
-          </a:effectRef>
-          <a:fontRef idx="minor">
-            <a:schemeClr val="lt1"/>
-          </a:fontRef>
-        </p:style>
-        <p:txBody>
-          <a:bodyPr rtlCol="0" anchor="ctr"/>
-          <a:lstStyle/>
-          <a:p>
-            <a:pPr algn="ctr"/>
-            <a:endParaRPr lang="en-US"/>
-          </a:p>
-        </p:txBody>
-      </p:sp>
-      <p:cxnSp>
-        <p:nvCxnSpPr>
-          <p:cNvPr id="12" name="Straight Arrow Connector 11">
-            <a:extLst>
-              <a:ext uri="{FF2B5EF4-FFF2-40B4-BE49-F238E27FC236}">
-                <a16:creationId xmlns:a16="http://schemas.microsoft.com/office/drawing/2014/main" id="{F3908FF0-D15A-42D6-966F-3B8B48BD4177}"/>
-              </a:ext>
-            </a:extLst>
-          </p:cNvPr>
-          <p:cNvCxnSpPr/>
-          <p:nvPr/>
-        </p:nvCxnSpPr>
-        <p:spPr>
-          <a:xfrm>
-            <a:off x="1113364" y="1891862"/>
-            <a:ext cx="3207812" cy="0"/>
-          </a:xfrm>
-          <a:prstGeom prst="straightConnector1">
-            <a:avLst/>
-          </a:prstGeom>
-          <a:ln w="28575">
-            <a:solidFill>
-              <a:schemeClr val="bg1">
-                <a:lumMod val="95000"/>
-              </a:schemeClr>
-            </a:solidFill>
-            <a:tailEnd type="triangle"/>
-          </a:ln>
         </p:spPr>
         <p:style>
           <a:lnRef idx="1">
@@ -5476,34 +4861,28 @@
       </p:cxnSp>
       <p:cxnSp>
         <p:nvCxnSpPr>
-          <p:cNvPr id="51" name="Straight Arrow Connector 50">
-            <a:extLst>
-              <a:ext uri="{FF2B5EF4-FFF2-40B4-BE49-F238E27FC236}">
-                <a16:creationId xmlns:a16="http://schemas.microsoft.com/office/drawing/2014/main" id="{FD2EB326-5CD4-42AC-A9ED-2D1853B9BAC7}"/>
+          <p:cNvPr id="44" name="Straight Connector 43">
+            <a:extLst>
+              <a:ext uri="{FF2B5EF4-FFF2-40B4-BE49-F238E27FC236}">
+                <a16:creationId xmlns:a16="http://schemas.microsoft.com/office/drawing/2014/main" id="{ADFF407D-D1CF-4024-9DD2-BE4BCBB41BBB}"/>
               </a:ext>
             </a:extLst>
           </p:cNvPr>
           <p:cNvCxnSpPr>
             <a:cxnSpLocks/>
+            <a:stCxn id="9" idx="0"/>
+            <a:endCxn id="37" idx="3"/>
           </p:cNvCxnSpPr>
           <p:nvPr/>
         </p:nvCxnSpPr>
         <p:spPr>
-          <a:xfrm>
-            <a:off x="1106035" y="3084786"/>
-            <a:ext cx="2772227" cy="0"/>
-          </a:xfrm>
-          <a:prstGeom prst="straightConnector1">
+          <a:xfrm flipH="1" flipV="1">
+            <a:off x="2653278" y="1292671"/>
+            <a:ext cx="84000" cy="305171"/>
+          </a:xfrm>
+          <a:prstGeom prst="line">
             <a:avLst/>
           </a:prstGeom>
-          <a:ln w="28575">
-            <a:solidFill>
-              <a:schemeClr val="bg1">
-                <a:lumMod val="95000"/>
-              </a:schemeClr>
-            </a:solidFill>
-            <a:tailEnd type="triangle"/>
-          </a:ln>
         </p:spPr>
         <p:style>
           <a:lnRef idx="1">
@@ -5522,360 +4901,27 @@
       </p:cxnSp>
       <p:cxnSp>
         <p:nvCxnSpPr>
-          <p:cNvPr id="52" name="Straight Arrow Connector 51">
-            <a:extLst>
-              <a:ext uri="{FF2B5EF4-FFF2-40B4-BE49-F238E27FC236}">
-                <a16:creationId xmlns:a16="http://schemas.microsoft.com/office/drawing/2014/main" id="{49BEEE88-3293-4D80-9DC1-1DE463779C7A}"/>
+          <p:cNvPr id="47" name="Straight Connector 46">
+            <a:extLst>
+              <a:ext uri="{FF2B5EF4-FFF2-40B4-BE49-F238E27FC236}">
+                <a16:creationId xmlns:a16="http://schemas.microsoft.com/office/drawing/2014/main" id="{8CC6889D-E8FA-486F-8C4C-0CE959A7BA67}"/>
               </a:ext>
             </a:extLst>
           </p:cNvPr>
           <p:cNvCxnSpPr>
-            <a:cxnSpLocks/>
+            <a:stCxn id="10" idx="0"/>
+            <a:endCxn id="37" idx="2"/>
           </p:cNvCxnSpPr>
           <p:nvPr/>
         </p:nvCxnSpPr>
         <p:spPr>
-          <a:xfrm>
-            <a:off x="1106034" y="4445875"/>
-            <a:ext cx="2216861" cy="0"/>
-          </a:xfrm>
-          <a:prstGeom prst="straightConnector1">
+          <a:xfrm flipH="1" flipV="1">
+            <a:off x="1781341" y="1477337"/>
+            <a:ext cx="25866" cy="120505"/>
+          </a:xfrm>
+          <a:prstGeom prst="line">
             <a:avLst/>
           </a:prstGeom>
-          <a:ln w="28575">
-            <a:solidFill>
-              <a:schemeClr val="bg1">
-                <a:lumMod val="95000"/>
-              </a:schemeClr>
-            </a:solidFill>
-            <a:tailEnd type="triangle"/>
-          </a:ln>
-        </p:spPr>
-        <p:style>
-          <a:lnRef idx="1">
-            <a:schemeClr val="accent1"/>
-          </a:lnRef>
-          <a:fillRef idx="0">
-            <a:schemeClr val="accent1"/>
-          </a:fillRef>
-          <a:effectRef idx="0">
-            <a:schemeClr val="accent1"/>
-          </a:effectRef>
-          <a:fontRef idx="minor">
-            <a:schemeClr val="tx1"/>
-          </a:fontRef>
-        </p:style>
-      </p:cxnSp>
-      <p:cxnSp>
-        <p:nvCxnSpPr>
-          <p:cNvPr id="54" name="Straight Arrow Connector 53">
-            <a:extLst>
-              <a:ext uri="{FF2B5EF4-FFF2-40B4-BE49-F238E27FC236}">
-                <a16:creationId xmlns:a16="http://schemas.microsoft.com/office/drawing/2014/main" id="{367AB90A-79ED-4447-89F9-0C83BEE591BB}"/>
-              </a:ext>
-            </a:extLst>
-          </p:cNvPr>
-          <p:cNvCxnSpPr>
-            <a:cxnSpLocks/>
-          </p:cNvCxnSpPr>
-          <p:nvPr/>
-        </p:nvCxnSpPr>
-        <p:spPr>
-          <a:xfrm>
-            <a:off x="1106033" y="5628289"/>
-            <a:ext cx="2216861" cy="0"/>
-          </a:xfrm>
-          <a:prstGeom prst="straightConnector1">
-            <a:avLst/>
-          </a:prstGeom>
-          <a:ln w="28575">
-            <a:solidFill>
-              <a:schemeClr val="bg1">
-                <a:lumMod val="95000"/>
-              </a:schemeClr>
-            </a:solidFill>
-            <a:tailEnd type="triangle"/>
-          </a:ln>
-        </p:spPr>
-        <p:style>
-          <a:lnRef idx="1">
-            <a:schemeClr val="accent1"/>
-          </a:lnRef>
-          <a:fillRef idx="0">
-            <a:schemeClr val="accent1"/>
-          </a:fillRef>
-          <a:effectRef idx="0">
-            <a:schemeClr val="accent1"/>
-          </a:effectRef>
-          <a:fontRef idx="minor">
-            <a:schemeClr val="tx1"/>
-          </a:fontRef>
-        </p:style>
-      </p:cxnSp>
-      <p:cxnSp>
-        <p:nvCxnSpPr>
-          <p:cNvPr id="55" name="Straight Arrow Connector 54">
-            <a:extLst>
-              <a:ext uri="{FF2B5EF4-FFF2-40B4-BE49-F238E27FC236}">
-                <a16:creationId xmlns:a16="http://schemas.microsoft.com/office/drawing/2014/main" id="{2EED0569-C629-4AF2-AC12-FFAAA4907B43}"/>
-              </a:ext>
-            </a:extLst>
-          </p:cNvPr>
-          <p:cNvCxnSpPr>
-            <a:cxnSpLocks/>
-            <a:stCxn id="40" idx="3"/>
-          </p:cNvCxnSpPr>
-          <p:nvPr/>
-        </p:nvCxnSpPr>
-        <p:spPr>
-          <a:xfrm flipV="1">
-            <a:off x="2097084" y="5839501"/>
-            <a:ext cx="1233141" cy="31532"/>
-          </a:xfrm>
-          <a:prstGeom prst="straightConnector1">
-            <a:avLst/>
-          </a:prstGeom>
-          <a:ln w="28575">
-            <a:solidFill>
-              <a:schemeClr val="bg1">
-                <a:lumMod val="85000"/>
-              </a:schemeClr>
-            </a:solidFill>
-            <a:tailEnd type="triangle"/>
-          </a:ln>
-        </p:spPr>
-        <p:style>
-          <a:lnRef idx="1">
-            <a:schemeClr val="accent1"/>
-          </a:lnRef>
-          <a:fillRef idx="0">
-            <a:schemeClr val="accent1"/>
-          </a:fillRef>
-          <a:effectRef idx="0">
-            <a:schemeClr val="accent1"/>
-          </a:effectRef>
-          <a:fontRef idx="minor">
-            <a:schemeClr val="tx1"/>
-          </a:fontRef>
-        </p:style>
-      </p:cxnSp>
-      <p:cxnSp>
-        <p:nvCxnSpPr>
-          <p:cNvPr id="59" name="Straight Arrow Connector 58">
-            <a:extLst>
-              <a:ext uri="{FF2B5EF4-FFF2-40B4-BE49-F238E27FC236}">
-                <a16:creationId xmlns:a16="http://schemas.microsoft.com/office/drawing/2014/main" id="{AB98BCA1-1DAB-4307-B102-BAD802066D8B}"/>
-              </a:ext>
-            </a:extLst>
-          </p:cNvPr>
-          <p:cNvCxnSpPr>
-            <a:cxnSpLocks/>
-          </p:cNvCxnSpPr>
-          <p:nvPr/>
-        </p:nvCxnSpPr>
-        <p:spPr>
-          <a:xfrm flipV="1">
-            <a:off x="2167834" y="4709021"/>
-            <a:ext cx="1155060" cy="11784"/>
-          </a:xfrm>
-          <a:prstGeom prst="straightConnector1">
-            <a:avLst/>
-          </a:prstGeom>
-          <a:ln w="28575">
-            <a:solidFill>
-              <a:schemeClr val="bg1">
-                <a:lumMod val="85000"/>
-              </a:schemeClr>
-            </a:solidFill>
-            <a:tailEnd type="triangle"/>
-          </a:ln>
-        </p:spPr>
-        <p:style>
-          <a:lnRef idx="1">
-            <a:schemeClr val="accent1"/>
-          </a:lnRef>
-          <a:fillRef idx="0">
-            <a:schemeClr val="accent1"/>
-          </a:fillRef>
-          <a:effectRef idx="0">
-            <a:schemeClr val="accent1"/>
-          </a:effectRef>
-          <a:fontRef idx="minor">
-            <a:schemeClr val="tx1"/>
-          </a:fontRef>
-        </p:style>
-      </p:cxnSp>
-      <p:cxnSp>
-        <p:nvCxnSpPr>
-          <p:cNvPr id="60" name="Straight Arrow Connector 59">
-            <a:extLst>
-              <a:ext uri="{FF2B5EF4-FFF2-40B4-BE49-F238E27FC236}">
-                <a16:creationId xmlns:a16="http://schemas.microsoft.com/office/drawing/2014/main" id="{B298B9AC-AD89-49C4-A87C-CF83CB7E765A}"/>
-              </a:ext>
-            </a:extLst>
-          </p:cNvPr>
-          <p:cNvCxnSpPr>
-            <a:cxnSpLocks/>
-            <a:endCxn id="6" idx="1"/>
-          </p:cNvCxnSpPr>
-          <p:nvPr/>
-        </p:nvCxnSpPr>
-        <p:spPr>
-          <a:xfrm>
-            <a:off x="2136124" y="3243122"/>
-            <a:ext cx="1742138" cy="8078"/>
-          </a:xfrm>
-          <a:prstGeom prst="straightConnector1">
-            <a:avLst/>
-          </a:prstGeom>
-          <a:ln w="28575">
-            <a:solidFill>
-              <a:schemeClr val="bg1">
-                <a:lumMod val="85000"/>
-              </a:schemeClr>
-            </a:solidFill>
-            <a:tailEnd type="triangle"/>
-          </a:ln>
-        </p:spPr>
-        <p:style>
-          <a:lnRef idx="1">
-            <a:schemeClr val="accent1"/>
-          </a:lnRef>
-          <a:fillRef idx="0">
-            <a:schemeClr val="accent1"/>
-          </a:fillRef>
-          <a:effectRef idx="0">
-            <a:schemeClr val="accent1"/>
-          </a:effectRef>
-          <a:fontRef idx="minor">
-            <a:schemeClr val="tx1"/>
-          </a:fontRef>
-        </p:style>
-      </p:cxnSp>
-      <p:cxnSp>
-        <p:nvCxnSpPr>
-          <p:cNvPr id="61" name="Straight Arrow Connector 60">
-            <a:extLst>
-              <a:ext uri="{FF2B5EF4-FFF2-40B4-BE49-F238E27FC236}">
-                <a16:creationId xmlns:a16="http://schemas.microsoft.com/office/drawing/2014/main" id="{57D81D03-F5DB-4BFD-980F-498DED8CC8A7}"/>
-              </a:ext>
-            </a:extLst>
-          </p:cNvPr>
-          <p:cNvCxnSpPr>
-            <a:cxnSpLocks/>
-          </p:cNvCxnSpPr>
-          <p:nvPr/>
-        </p:nvCxnSpPr>
-        <p:spPr>
-          <a:xfrm flipV="1">
-            <a:off x="2109105" y="2037912"/>
-            <a:ext cx="2212071" cy="15893"/>
-          </a:xfrm>
-          <a:prstGeom prst="straightConnector1">
-            <a:avLst/>
-          </a:prstGeom>
-          <a:ln w="28575">
-            <a:solidFill>
-              <a:schemeClr val="bg1">
-                <a:lumMod val="85000"/>
-              </a:schemeClr>
-            </a:solidFill>
-            <a:tailEnd type="triangle"/>
-          </a:ln>
-        </p:spPr>
-        <p:style>
-          <a:lnRef idx="1">
-            <a:schemeClr val="accent1"/>
-          </a:lnRef>
-          <a:fillRef idx="0">
-            <a:schemeClr val="accent1"/>
-          </a:fillRef>
-          <a:effectRef idx="0">
-            <a:schemeClr val="accent1"/>
-          </a:effectRef>
-          <a:fontRef idx="minor">
-            <a:schemeClr val="tx1"/>
-          </a:fontRef>
-        </p:style>
-      </p:cxnSp>
-      <p:cxnSp>
-        <p:nvCxnSpPr>
-          <p:cNvPr id="64" name="Straight Arrow Connector 63">
-            <a:extLst>
-              <a:ext uri="{FF2B5EF4-FFF2-40B4-BE49-F238E27FC236}">
-                <a16:creationId xmlns:a16="http://schemas.microsoft.com/office/drawing/2014/main" id="{664A1E84-9277-4D82-9672-70493868F560}"/>
-              </a:ext>
-            </a:extLst>
-          </p:cNvPr>
-          <p:cNvCxnSpPr>
-            <a:cxnSpLocks/>
-          </p:cNvCxnSpPr>
-          <p:nvPr/>
-        </p:nvCxnSpPr>
-        <p:spPr>
-          <a:xfrm>
-            <a:off x="3068069" y="6082244"/>
-            <a:ext cx="254825" cy="15070"/>
-          </a:xfrm>
-          <a:prstGeom prst="straightConnector1">
-            <a:avLst/>
-          </a:prstGeom>
-          <a:ln w="28575">
-            <a:solidFill>
-              <a:schemeClr val="tx2">
-                <a:lumMod val="20000"/>
-                <a:lumOff val="80000"/>
-              </a:schemeClr>
-            </a:solidFill>
-            <a:tailEnd type="triangle"/>
-          </a:ln>
-        </p:spPr>
-        <p:style>
-          <a:lnRef idx="1">
-            <a:schemeClr val="accent1"/>
-          </a:lnRef>
-          <a:fillRef idx="0">
-            <a:schemeClr val="accent1"/>
-          </a:fillRef>
-          <a:effectRef idx="0">
-            <a:schemeClr val="accent1"/>
-          </a:effectRef>
-          <a:fontRef idx="minor">
-            <a:schemeClr val="tx1"/>
-          </a:fontRef>
-        </p:style>
-      </p:cxnSp>
-      <p:cxnSp>
-        <p:nvCxnSpPr>
-          <p:cNvPr id="69" name="Straight Arrow Connector 68">
-            <a:extLst>
-              <a:ext uri="{FF2B5EF4-FFF2-40B4-BE49-F238E27FC236}">
-                <a16:creationId xmlns:a16="http://schemas.microsoft.com/office/drawing/2014/main" id="{B4944542-04B4-408C-A960-7FB02DCF4A7E}"/>
-              </a:ext>
-            </a:extLst>
-          </p:cNvPr>
-          <p:cNvCxnSpPr>
-            <a:cxnSpLocks/>
-          </p:cNvCxnSpPr>
-          <p:nvPr/>
-        </p:nvCxnSpPr>
-        <p:spPr>
-          <a:xfrm flipV="1">
-            <a:off x="3035289" y="4928476"/>
-            <a:ext cx="254353" cy="1"/>
-          </a:xfrm>
-          <a:prstGeom prst="straightConnector1">
-            <a:avLst/>
-          </a:prstGeom>
-          <a:ln w="28575">
-            <a:solidFill>
-              <a:schemeClr val="tx2">
-                <a:lumMod val="20000"/>
-                <a:lumOff val="80000"/>
-              </a:schemeClr>
-            </a:solidFill>
-            <a:tailEnd type="triangle"/>
-          </a:ln>
         </p:spPr>
         <p:style>
           <a:lnRef idx="1">
@@ -5897,7 +4943,7 @@
           <p:cNvPr id="70" name="Straight Arrow Connector 69">
             <a:extLst>
               <a:ext uri="{FF2B5EF4-FFF2-40B4-BE49-F238E27FC236}">
-                <a16:creationId xmlns:a16="http://schemas.microsoft.com/office/drawing/2014/main" id="{9A8DC68D-F274-4D34-B0CE-3D389B5C9A8F}"/>
+                <a16:creationId xmlns:a16="http://schemas.microsoft.com/office/drawing/2014/main" id="{EA48C3C1-120D-4EC2-B92D-492D228D70E0}"/>
               </a:ext>
             </a:extLst>
           </p:cNvPr>
@@ -5907,21 +4953,22 @@
           <p:nvPr/>
         </p:nvCxnSpPr>
         <p:spPr>
-          <a:xfrm flipV="1">
-            <a:off x="3020402" y="3514345"/>
-            <a:ext cx="857860" cy="8410"/>
+          <a:xfrm>
+            <a:off x="8223407" y="2399177"/>
+            <a:ext cx="0" cy="330612"/>
           </a:xfrm>
           <a:prstGeom prst="straightConnector1">
             <a:avLst/>
           </a:prstGeom>
-          <a:ln w="28575">
+          <a:ln w="38100">
             <a:solidFill>
-              <a:schemeClr val="tx2">
-                <a:lumMod val="20000"/>
-                <a:lumOff val="80000"/>
+              <a:schemeClr val="accent5">
+                <a:lumMod val="60000"/>
+                <a:lumOff val="40000"/>
               </a:schemeClr>
             </a:solidFill>
-            <a:tailEnd type="triangle"/>
+            <a:headEnd type="none" w="med" len="med"/>
+            <a:tailEnd type="triangle" w="med" len="med"/>
           </a:ln>
         </p:spPr>
         <p:style>
@@ -5944,7 +4991,7 @@
           <p:cNvPr id="72" name="Straight Arrow Connector 71">
             <a:extLst>
               <a:ext uri="{FF2B5EF4-FFF2-40B4-BE49-F238E27FC236}">
-                <a16:creationId xmlns:a16="http://schemas.microsoft.com/office/drawing/2014/main" id="{5FE1597F-C9A5-4151-9FEE-26DD1B288A47}"/>
+                <a16:creationId xmlns:a16="http://schemas.microsoft.com/office/drawing/2014/main" id="{FB4524E8-D0AB-4322-82FE-49CD6A2DC130}"/>
               </a:ext>
             </a:extLst>
           </p:cNvPr>
@@ -5954,21 +5001,970 @@
           <p:nvPr/>
         </p:nvCxnSpPr>
         <p:spPr>
-          <a:xfrm>
-            <a:off x="3020402" y="2242565"/>
-            <a:ext cx="1265957" cy="0"/>
+          <a:xfrm flipV="1">
+            <a:off x="6583516" y="740674"/>
+            <a:ext cx="0" cy="782415"/>
           </a:xfrm>
           <a:prstGeom prst="straightConnector1">
             <a:avLst/>
           </a:prstGeom>
-          <a:ln w="28575">
+          <a:ln w="57150">
+            <a:solidFill>
+              <a:schemeClr val="bg2">
+                <a:lumMod val="50000"/>
+              </a:schemeClr>
+            </a:solidFill>
+            <a:headEnd type="triangle" w="med" len="med"/>
+            <a:tailEnd type="none" w="med" len="med"/>
+          </a:ln>
+        </p:spPr>
+        <p:style>
+          <a:lnRef idx="1">
+            <a:schemeClr val="accent1"/>
+          </a:lnRef>
+          <a:fillRef idx="0">
+            <a:schemeClr val="accent1"/>
+          </a:fillRef>
+          <a:effectRef idx="0">
+            <a:schemeClr val="accent1"/>
+          </a:effectRef>
+          <a:fontRef idx="minor">
+            <a:schemeClr val="tx1"/>
+          </a:fontRef>
+        </p:style>
+      </p:cxnSp>
+      <p:cxnSp>
+        <p:nvCxnSpPr>
+          <p:cNvPr id="83" name="Connector: Elbow 82">
+            <a:extLst>
+              <a:ext uri="{FF2B5EF4-FFF2-40B4-BE49-F238E27FC236}">
+                <a16:creationId xmlns:a16="http://schemas.microsoft.com/office/drawing/2014/main" id="{24B5C449-3CD5-4783-96EC-B49D85488856}"/>
+              </a:ext>
+            </a:extLst>
+          </p:cNvPr>
+          <p:cNvCxnSpPr>
+            <a:cxnSpLocks/>
+          </p:cNvCxnSpPr>
+          <p:nvPr/>
+        </p:nvCxnSpPr>
+        <p:spPr>
+          <a:xfrm>
+            <a:off x="3671132" y="2888127"/>
+            <a:ext cx="2045095" cy="536911"/>
+          </a:xfrm>
+          <a:prstGeom prst="bentConnector3">
+            <a:avLst>
+              <a:gd name="adj1" fmla="val 100243"/>
+            </a:avLst>
+          </a:prstGeom>
+          <a:ln w="38100">
+            <a:solidFill>
+              <a:srgbClr val="C00000"/>
+            </a:solidFill>
+            <a:headEnd type="none" w="med" len="med"/>
+            <a:tailEnd type="triangle" w="med" len="med"/>
+          </a:ln>
+        </p:spPr>
+        <p:style>
+          <a:lnRef idx="1">
+            <a:schemeClr val="accent1"/>
+          </a:lnRef>
+          <a:fillRef idx="0">
+            <a:schemeClr val="accent1"/>
+          </a:fillRef>
+          <a:effectRef idx="0">
+            <a:schemeClr val="accent1"/>
+          </a:effectRef>
+          <a:fontRef idx="minor">
+            <a:schemeClr val="tx1"/>
+          </a:fontRef>
+        </p:style>
+      </p:cxnSp>
+      <p:sp>
+        <p:nvSpPr>
+          <p:cNvPr id="86" name="Rectangle: Rounded Corners 85">
+            <a:extLst>
+              <a:ext uri="{FF2B5EF4-FFF2-40B4-BE49-F238E27FC236}">
+                <a16:creationId xmlns:a16="http://schemas.microsoft.com/office/drawing/2014/main" id="{D12661D5-E89A-41DC-96E0-43F28600FECB}"/>
+              </a:ext>
+            </a:extLst>
+          </p:cNvPr>
+          <p:cNvSpPr/>
+          <p:nvPr/>
+        </p:nvSpPr>
+        <p:spPr>
+          <a:xfrm>
+            <a:off x="7762672" y="2743200"/>
+            <a:ext cx="3498858" cy="2265680"/>
+          </a:xfrm>
+          <a:prstGeom prst="roundRect">
+            <a:avLst>
+              <a:gd name="adj" fmla="val 8570"/>
+            </a:avLst>
+          </a:prstGeom>
+          <a:noFill/>
+          <a:ln w="19050">
+            <a:solidFill>
+              <a:schemeClr val="tx1"/>
+            </a:solidFill>
+          </a:ln>
+        </p:spPr>
+        <p:style>
+          <a:lnRef idx="2">
+            <a:schemeClr val="accent1">
+              <a:shade val="50000"/>
+            </a:schemeClr>
+          </a:lnRef>
+          <a:fillRef idx="1">
+            <a:schemeClr val="accent1"/>
+          </a:fillRef>
+          <a:effectRef idx="0">
+            <a:schemeClr val="accent1"/>
+          </a:effectRef>
+          <a:fontRef idx="minor">
+            <a:schemeClr val="lt1"/>
+          </a:fontRef>
+        </p:style>
+        <p:txBody>
+          <a:bodyPr rtlCol="0" anchor="ctr"/>
+          <a:lstStyle/>
+          <a:p>
+            <a:pPr algn="ctr"/>
+            <a:endParaRPr lang="en-US"/>
+          </a:p>
+        </p:txBody>
+      </p:sp>
+      <p:cxnSp>
+        <p:nvCxnSpPr>
+          <p:cNvPr id="25" name="Connector: Elbow 24">
+            <a:extLst>
+              <a:ext uri="{FF2B5EF4-FFF2-40B4-BE49-F238E27FC236}">
+                <a16:creationId xmlns:a16="http://schemas.microsoft.com/office/drawing/2014/main" id="{3562C0E0-F682-43EC-BC62-EDE75E710ED9}"/>
+              </a:ext>
+            </a:extLst>
+          </p:cNvPr>
+          <p:cNvCxnSpPr>
+            <a:cxnSpLocks/>
+            <a:stCxn id="5" idx="1"/>
+          </p:cNvCxnSpPr>
+          <p:nvPr/>
+        </p:nvCxnSpPr>
+        <p:spPr>
+          <a:xfrm rot="10800000" flipV="1">
+            <a:off x="4825197" y="3844991"/>
+            <a:ext cx="376037" cy="941926"/>
+          </a:xfrm>
+          <a:prstGeom prst="bentConnector2">
+            <a:avLst/>
+          </a:prstGeom>
+          <a:ln w="38100">
+            <a:tailEnd type="triangle"/>
+          </a:ln>
+        </p:spPr>
+        <p:style>
+          <a:lnRef idx="1">
+            <a:schemeClr val="accent1"/>
+          </a:lnRef>
+          <a:fillRef idx="0">
+            <a:schemeClr val="accent1"/>
+          </a:fillRef>
+          <a:effectRef idx="0">
+            <a:schemeClr val="accent1"/>
+          </a:effectRef>
+          <a:fontRef idx="minor">
+            <a:schemeClr val="tx1"/>
+          </a:fontRef>
+        </p:style>
+      </p:cxnSp>
+      <p:cxnSp>
+        <p:nvCxnSpPr>
+          <p:cNvPr id="60" name="Connector: Elbow 59">
+            <a:extLst>
+              <a:ext uri="{FF2B5EF4-FFF2-40B4-BE49-F238E27FC236}">
+                <a16:creationId xmlns:a16="http://schemas.microsoft.com/office/drawing/2014/main" id="{AA700FF1-48EA-43AC-A5D7-9051B98135CC}"/>
+              </a:ext>
+            </a:extLst>
+          </p:cNvPr>
+          <p:cNvCxnSpPr>
+            <a:cxnSpLocks/>
+            <a:stCxn id="5" idx="3"/>
+          </p:cNvCxnSpPr>
+          <p:nvPr/>
+        </p:nvCxnSpPr>
+        <p:spPr>
+          <a:xfrm>
+            <a:off x="7612309" y="3844991"/>
+            <a:ext cx="592841" cy="183170"/>
+          </a:xfrm>
+          <a:prstGeom prst="bentConnector3">
+            <a:avLst>
+              <a:gd name="adj1" fmla="val 100763"/>
+            </a:avLst>
+          </a:prstGeom>
+          <a:ln w="38100">
+            <a:tailEnd type="triangle"/>
+          </a:ln>
+        </p:spPr>
+        <p:style>
+          <a:lnRef idx="1">
+            <a:schemeClr val="accent1"/>
+          </a:lnRef>
+          <a:fillRef idx="0">
+            <a:schemeClr val="accent1"/>
+          </a:fillRef>
+          <a:effectRef idx="0">
+            <a:schemeClr val="accent1"/>
+          </a:effectRef>
+          <a:fontRef idx="minor">
+            <a:schemeClr val="tx1"/>
+          </a:fontRef>
+        </p:style>
+      </p:cxnSp>
+      <p:sp>
+        <p:nvSpPr>
+          <p:cNvPr id="69" name="Rectangle 68">
+            <a:extLst>
+              <a:ext uri="{FF2B5EF4-FFF2-40B4-BE49-F238E27FC236}">
+                <a16:creationId xmlns:a16="http://schemas.microsoft.com/office/drawing/2014/main" id="{9A66F71E-7F83-4FD2-8198-F306CFB80DD1}"/>
+              </a:ext>
+            </a:extLst>
+          </p:cNvPr>
+          <p:cNvSpPr/>
+          <p:nvPr/>
+        </p:nvSpPr>
+        <p:spPr>
+          <a:xfrm>
+            <a:off x="240262" y="5310385"/>
+            <a:ext cx="766312" cy="756565"/>
+          </a:xfrm>
+          <a:prstGeom prst="rect">
+            <a:avLst/>
+          </a:prstGeom>
+          <a:solidFill>
+            <a:schemeClr val="bg2">
+              <a:alpha val="24000"/>
+            </a:schemeClr>
+          </a:solidFill>
+        </p:spPr>
+        <p:style>
+          <a:lnRef idx="2">
+            <a:schemeClr val="accent1">
+              <a:shade val="50000"/>
+            </a:schemeClr>
+          </a:lnRef>
+          <a:fillRef idx="1">
+            <a:schemeClr val="accent1"/>
+          </a:fillRef>
+          <a:effectRef idx="0">
+            <a:schemeClr val="accent1"/>
+          </a:effectRef>
+          <a:fontRef idx="minor">
+            <a:schemeClr val="lt1"/>
+          </a:fontRef>
+        </p:style>
+        <p:txBody>
+          <a:bodyPr rtlCol="0" anchor="ctr"/>
+          <a:lstStyle/>
+          <a:p>
+            <a:pPr algn="ctr"/>
+            <a:endParaRPr lang="en-US"/>
+          </a:p>
+        </p:txBody>
+      </p:sp>
+      <p:sp>
+        <p:nvSpPr>
+          <p:cNvPr id="71" name="Rectangle 70">
+            <a:extLst>
+              <a:ext uri="{FF2B5EF4-FFF2-40B4-BE49-F238E27FC236}">
+                <a16:creationId xmlns:a16="http://schemas.microsoft.com/office/drawing/2014/main" id="{870AEABA-E167-4F95-B064-9C17979B2BA2}"/>
+              </a:ext>
+            </a:extLst>
+          </p:cNvPr>
+          <p:cNvSpPr/>
+          <p:nvPr/>
+        </p:nvSpPr>
+        <p:spPr>
+          <a:xfrm>
+            <a:off x="240262" y="4128847"/>
+            <a:ext cx="766312" cy="756565"/>
+          </a:xfrm>
+          <a:prstGeom prst="rect">
+            <a:avLst/>
+          </a:prstGeom>
+          <a:solidFill>
+            <a:schemeClr val="bg2">
+              <a:alpha val="24000"/>
+            </a:schemeClr>
+          </a:solidFill>
+        </p:spPr>
+        <p:style>
+          <a:lnRef idx="2">
+            <a:schemeClr val="accent1">
+              <a:shade val="50000"/>
+            </a:schemeClr>
+          </a:lnRef>
+          <a:fillRef idx="1">
+            <a:schemeClr val="accent1"/>
+          </a:fillRef>
+          <a:effectRef idx="0">
+            <a:schemeClr val="accent1"/>
+          </a:effectRef>
+          <a:fontRef idx="minor">
+            <a:schemeClr val="lt1"/>
+          </a:fontRef>
+        </p:style>
+        <p:txBody>
+          <a:bodyPr rtlCol="0" anchor="ctr"/>
+          <a:lstStyle/>
+          <a:p>
+            <a:pPr algn="ctr"/>
+            <a:endParaRPr lang="en-US"/>
+          </a:p>
+        </p:txBody>
+      </p:sp>
+      <p:sp>
+        <p:nvSpPr>
+          <p:cNvPr id="73" name="Rectangle 72">
+            <a:extLst>
+              <a:ext uri="{FF2B5EF4-FFF2-40B4-BE49-F238E27FC236}">
+                <a16:creationId xmlns:a16="http://schemas.microsoft.com/office/drawing/2014/main" id="{A7BDC8F3-62C4-46AE-8F55-A47CB45E1D94}"/>
+              </a:ext>
+            </a:extLst>
+          </p:cNvPr>
+          <p:cNvSpPr/>
+          <p:nvPr/>
+        </p:nvSpPr>
+        <p:spPr>
+          <a:xfrm>
+            <a:off x="240262" y="2947310"/>
+            <a:ext cx="766312" cy="756565"/>
+          </a:xfrm>
+          <a:prstGeom prst="rect">
+            <a:avLst/>
+          </a:prstGeom>
+          <a:solidFill>
+            <a:schemeClr val="bg2">
+              <a:alpha val="24000"/>
+            </a:schemeClr>
+          </a:solidFill>
+        </p:spPr>
+        <p:style>
+          <a:lnRef idx="2">
+            <a:schemeClr val="accent1">
+              <a:shade val="50000"/>
+            </a:schemeClr>
+          </a:lnRef>
+          <a:fillRef idx="1">
+            <a:schemeClr val="accent1"/>
+          </a:fillRef>
+          <a:effectRef idx="0">
+            <a:schemeClr val="accent1"/>
+          </a:effectRef>
+          <a:fontRef idx="minor">
+            <a:schemeClr val="lt1"/>
+          </a:fontRef>
+        </p:style>
+        <p:txBody>
+          <a:bodyPr rtlCol="0" anchor="ctr"/>
+          <a:lstStyle/>
+          <a:p>
+            <a:pPr algn="ctr"/>
+            <a:endParaRPr lang="en-US"/>
+          </a:p>
+        </p:txBody>
+      </p:sp>
+      <p:sp>
+        <p:nvSpPr>
+          <p:cNvPr id="74" name="Rectangle 73">
+            <a:extLst>
+              <a:ext uri="{FF2B5EF4-FFF2-40B4-BE49-F238E27FC236}">
+                <a16:creationId xmlns:a16="http://schemas.microsoft.com/office/drawing/2014/main" id="{152C64C5-8D3E-4C5B-A795-96D1011C96E8}"/>
+              </a:ext>
+            </a:extLst>
+          </p:cNvPr>
+          <p:cNvSpPr/>
+          <p:nvPr/>
+        </p:nvSpPr>
+        <p:spPr>
+          <a:xfrm>
+            <a:off x="240262" y="1765773"/>
+            <a:ext cx="766312" cy="756565"/>
+          </a:xfrm>
+          <a:prstGeom prst="rect">
+            <a:avLst/>
+          </a:prstGeom>
+          <a:solidFill>
+            <a:schemeClr val="bg2">
+              <a:alpha val="24000"/>
+            </a:schemeClr>
+          </a:solidFill>
+        </p:spPr>
+        <p:style>
+          <a:lnRef idx="2">
+            <a:schemeClr val="accent1">
+              <a:shade val="50000"/>
+            </a:schemeClr>
+          </a:lnRef>
+          <a:fillRef idx="1">
+            <a:schemeClr val="accent1"/>
+          </a:fillRef>
+          <a:effectRef idx="0">
+            <a:schemeClr val="accent1"/>
+          </a:effectRef>
+          <a:fontRef idx="minor">
+            <a:schemeClr val="lt1"/>
+          </a:fontRef>
+        </p:style>
+        <p:txBody>
+          <a:bodyPr rtlCol="0" anchor="ctr"/>
+          <a:lstStyle/>
+          <a:p>
+            <a:pPr algn="ctr"/>
+            <a:endParaRPr lang="en-US"/>
+          </a:p>
+        </p:txBody>
+      </p:sp>
+      <p:sp>
+        <p:nvSpPr>
+          <p:cNvPr id="75" name="Rectangle 74">
+            <a:extLst>
+              <a:ext uri="{FF2B5EF4-FFF2-40B4-BE49-F238E27FC236}">
+                <a16:creationId xmlns:a16="http://schemas.microsoft.com/office/drawing/2014/main" id="{A085B9AC-40C0-4EA2-8A76-CDC58617C22B}"/>
+              </a:ext>
+            </a:extLst>
+          </p:cNvPr>
+          <p:cNvSpPr/>
+          <p:nvPr/>
+        </p:nvSpPr>
+        <p:spPr>
+          <a:xfrm>
+            <a:off x="1560095" y="5308741"/>
+            <a:ext cx="478019" cy="756565"/>
+          </a:xfrm>
+          <a:prstGeom prst="rect">
+            <a:avLst/>
+          </a:prstGeom>
+          <a:solidFill>
+            <a:schemeClr val="bg2">
+              <a:alpha val="24000"/>
+            </a:schemeClr>
+          </a:solidFill>
+        </p:spPr>
+        <p:style>
+          <a:lnRef idx="2">
+            <a:schemeClr val="accent1">
+              <a:shade val="50000"/>
+            </a:schemeClr>
+          </a:lnRef>
+          <a:fillRef idx="1">
+            <a:schemeClr val="accent1"/>
+          </a:fillRef>
+          <a:effectRef idx="0">
+            <a:schemeClr val="accent1"/>
+          </a:effectRef>
+          <a:fontRef idx="minor">
+            <a:schemeClr val="lt1"/>
+          </a:fontRef>
+        </p:style>
+        <p:txBody>
+          <a:bodyPr rtlCol="0" anchor="ctr"/>
+          <a:lstStyle/>
+          <a:p>
+            <a:pPr algn="ctr"/>
+            <a:endParaRPr lang="en-US"/>
+          </a:p>
+        </p:txBody>
+      </p:sp>
+      <p:sp>
+        <p:nvSpPr>
+          <p:cNvPr id="76" name="Rectangle 75">
+            <a:extLst>
+              <a:ext uri="{FF2B5EF4-FFF2-40B4-BE49-F238E27FC236}">
+                <a16:creationId xmlns:a16="http://schemas.microsoft.com/office/drawing/2014/main" id="{1B8E9977-2019-4892-B5CA-B85C40951B2C}"/>
+              </a:ext>
+            </a:extLst>
+          </p:cNvPr>
+          <p:cNvSpPr/>
+          <p:nvPr/>
+        </p:nvSpPr>
+        <p:spPr>
+          <a:xfrm>
+            <a:off x="1560095" y="4127203"/>
+            <a:ext cx="478019" cy="756565"/>
+          </a:xfrm>
+          <a:prstGeom prst="rect">
+            <a:avLst/>
+          </a:prstGeom>
+          <a:solidFill>
+            <a:schemeClr val="bg2">
+              <a:alpha val="24000"/>
+            </a:schemeClr>
+          </a:solidFill>
+        </p:spPr>
+        <p:style>
+          <a:lnRef idx="2">
+            <a:schemeClr val="accent1">
+              <a:shade val="50000"/>
+            </a:schemeClr>
+          </a:lnRef>
+          <a:fillRef idx="1">
+            <a:schemeClr val="accent1"/>
+          </a:fillRef>
+          <a:effectRef idx="0">
+            <a:schemeClr val="accent1"/>
+          </a:effectRef>
+          <a:fontRef idx="minor">
+            <a:schemeClr val="lt1"/>
+          </a:fontRef>
+        </p:style>
+        <p:txBody>
+          <a:bodyPr rtlCol="0" anchor="ctr"/>
+          <a:lstStyle/>
+          <a:p>
+            <a:pPr algn="ctr"/>
+            <a:endParaRPr lang="en-US"/>
+          </a:p>
+        </p:txBody>
+      </p:sp>
+      <p:sp>
+        <p:nvSpPr>
+          <p:cNvPr id="78" name="Rectangle 77">
+            <a:extLst>
+              <a:ext uri="{FF2B5EF4-FFF2-40B4-BE49-F238E27FC236}">
+                <a16:creationId xmlns:a16="http://schemas.microsoft.com/office/drawing/2014/main" id="{579628E7-9ED5-4E58-9912-8A08CABC4C56}"/>
+              </a:ext>
+            </a:extLst>
+          </p:cNvPr>
+          <p:cNvSpPr/>
+          <p:nvPr/>
+        </p:nvSpPr>
+        <p:spPr>
+          <a:xfrm>
+            <a:off x="1560095" y="2945666"/>
+            <a:ext cx="478019" cy="756565"/>
+          </a:xfrm>
+          <a:prstGeom prst="rect">
+            <a:avLst/>
+          </a:prstGeom>
+          <a:solidFill>
+            <a:schemeClr val="bg2">
+              <a:alpha val="24000"/>
+            </a:schemeClr>
+          </a:solidFill>
+        </p:spPr>
+        <p:style>
+          <a:lnRef idx="2">
+            <a:schemeClr val="accent1">
+              <a:shade val="50000"/>
+            </a:schemeClr>
+          </a:lnRef>
+          <a:fillRef idx="1">
+            <a:schemeClr val="accent1"/>
+          </a:fillRef>
+          <a:effectRef idx="0">
+            <a:schemeClr val="accent1"/>
+          </a:effectRef>
+          <a:fontRef idx="minor">
+            <a:schemeClr val="lt1"/>
+          </a:fontRef>
+        </p:style>
+        <p:txBody>
+          <a:bodyPr rtlCol="0" anchor="ctr"/>
+          <a:lstStyle/>
+          <a:p>
+            <a:pPr algn="ctr"/>
+            <a:endParaRPr lang="en-US"/>
+          </a:p>
+        </p:txBody>
+      </p:sp>
+      <p:sp>
+        <p:nvSpPr>
+          <p:cNvPr id="79" name="Rectangle 78">
+            <a:extLst>
+              <a:ext uri="{FF2B5EF4-FFF2-40B4-BE49-F238E27FC236}">
+                <a16:creationId xmlns:a16="http://schemas.microsoft.com/office/drawing/2014/main" id="{01782204-F541-4E0E-9C1C-BE24B69B1E7B}"/>
+              </a:ext>
+            </a:extLst>
+          </p:cNvPr>
+          <p:cNvSpPr/>
+          <p:nvPr/>
+        </p:nvSpPr>
+        <p:spPr>
+          <a:xfrm>
+            <a:off x="1560095" y="1764129"/>
+            <a:ext cx="478019" cy="756565"/>
+          </a:xfrm>
+          <a:prstGeom prst="rect">
+            <a:avLst/>
+          </a:prstGeom>
+          <a:solidFill>
+            <a:schemeClr val="bg2">
+              <a:alpha val="24000"/>
+            </a:schemeClr>
+          </a:solidFill>
+        </p:spPr>
+        <p:style>
+          <a:lnRef idx="2">
+            <a:schemeClr val="accent1">
+              <a:shade val="50000"/>
+            </a:schemeClr>
+          </a:lnRef>
+          <a:fillRef idx="1">
+            <a:schemeClr val="accent1"/>
+          </a:fillRef>
+          <a:effectRef idx="0">
+            <a:schemeClr val="accent1"/>
+          </a:effectRef>
+          <a:fontRef idx="minor">
+            <a:schemeClr val="lt1"/>
+          </a:fontRef>
+        </p:style>
+        <p:txBody>
+          <a:bodyPr rtlCol="0" anchor="ctr"/>
+          <a:lstStyle/>
+          <a:p>
+            <a:pPr algn="ctr"/>
+            <a:endParaRPr lang="en-US"/>
+          </a:p>
+        </p:txBody>
+      </p:sp>
+      <p:sp>
+        <p:nvSpPr>
+          <p:cNvPr id="80" name="Rectangle 79">
+            <a:extLst>
+              <a:ext uri="{FF2B5EF4-FFF2-40B4-BE49-F238E27FC236}">
+                <a16:creationId xmlns:a16="http://schemas.microsoft.com/office/drawing/2014/main" id="{57C4049E-8C88-4C4A-AAA4-CD4ECBB5BA67}"/>
+              </a:ext>
+            </a:extLst>
+          </p:cNvPr>
+          <p:cNvSpPr/>
+          <p:nvPr/>
+        </p:nvSpPr>
+        <p:spPr>
+          <a:xfrm>
+            <a:off x="2499181" y="5308741"/>
+            <a:ext cx="478019" cy="756565"/>
+          </a:xfrm>
+          <a:prstGeom prst="rect">
+            <a:avLst/>
+          </a:prstGeom>
+          <a:solidFill>
+            <a:schemeClr val="bg2">
+              <a:alpha val="24000"/>
+            </a:schemeClr>
+          </a:solidFill>
+        </p:spPr>
+        <p:style>
+          <a:lnRef idx="2">
+            <a:schemeClr val="accent1">
+              <a:shade val="50000"/>
+            </a:schemeClr>
+          </a:lnRef>
+          <a:fillRef idx="1">
+            <a:schemeClr val="accent1"/>
+          </a:fillRef>
+          <a:effectRef idx="0">
+            <a:schemeClr val="accent1"/>
+          </a:effectRef>
+          <a:fontRef idx="minor">
+            <a:schemeClr val="lt1"/>
+          </a:fontRef>
+        </p:style>
+        <p:txBody>
+          <a:bodyPr rtlCol="0" anchor="ctr"/>
+          <a:lstStyle/>
+          <a:p>
+            <a:pPr algn="ctr"/>
+            <a:endParaRPr lang="en-US"/>
+          </a:p>
+        </p:txBody>
+      </p:sp>
+      <p:sp>
+        <p:nvSpPr>
+          <p:cNvPr id="81" name="Rectangle 80">
+            <a:extLst>
+              <a:ext uri="{FF2B5EF4-FFF2-40B4-BE49-F238E27FC236}">
+                <a16:creationId xmlns:a16="http://schemas.microsoft.com/office/drawing/2014/main" id="{30B1D613-C56F-4A3F-8B69-100009F0638A}"/>
+              </a:ext>
+            </a:extLst>
+          </p:cNvPr>
+          <p:cNvSpPr/>
+          <p:nvPr/>
+        </p:nvSpPr>
+        <p:spPr>
+          <a:xfrm>
+            <a:off x="2499181" y="4127203"/>
+            <a:ext cx="478019" cy="756565"/>
+          </a:xfrm>
+          <a:prstGeom prst="rect">
+            <a:avLst/>
+          </a:prstGeom>
+          <a:solidFill>
+            <a:schemeClr val="bg2">
+              <a:alpha val="24000"/>
+            </a:schemeClr>
+          </a:solidFill>
+        </p:spPr>
+        <p:style>
+          <a:lnRef idx="2">
+            <a:schemeClr val="accent1">
+              <a:shade val="50000"/>
+            </a:schemeClr>
+          </a:lnRef>
+          <a:fillRef idx="1">
+            <a:schemeClr val="accent1"/>
+          </a:fillRef>
+          <a:effectRef idx="0">
+            <a:schemeClr val="accent1"/>
+          </a:effectRef>
+          <a:fontRef idx="minor">
+            <a:schemeClr val="lt1"/>
+          </a:fontRef>
+        </p:style>
+        <p:txBody>
+          <a:bodyPr rtlCol="0" anchor="ctr"/>
+          <a:lstStyle/>
+          <a:p>
+            <a:pPr algn="ctr"/>
+            <a:endParaRPr lang="en-US"/>
+          </a:p>
+        </p:txBody>
+      </p:sp>
+      <p:sp>
+        <p:nvSpPr>
+          <p:cNvPr id="82" name="Rectangle 81">
+            <a:extLst>
+              <a:ext uri="{FF2B5EF4-FFF2-40B4-BE49-F238E27FC236}">
+                <a16:creationId xmlns:a16="http://schemas.microsoft.com/office/drawing/2014/main" id="{736327BE-F082-4E0A-86EE-EA980525B5CB}"/>
+              </a:ext>
+            </a:extLst>
+          </p:cNvPr>
+          <p:cNvSpPr/>
+          <p:nvPr/>
+        </p:nvSpPr>
+        <p:spPr>
+          <a:xfrm>
+            <a:off x="2499181" y="2945666"/>
+            <a:ext cx="478019" cy="756565"/>
+          </a:xfrm>
+          <a:prstGeom prst="rect">
+            <a:avLst/>
+          </a:prstGeom>
+          <a:solidFill>
+            <a:schemeClr val="bg2">
+              <a:alpha val="24000"/>
+            </a:schemeClr>
+          </a:solidFill>
+        </p:spPr>
+        <p:style>
+          <a:lnRef idx="2">
+            <a:schemeClr val="accent1">
+              <a:shade val="50000"/>
+            </a:schemeClr>
+          </a:lnRef>
+          <a:fillRef idx="1">
+            <a:schemeClr val="accent1"/>
+          </a:fillRef>
+          <a:effectRef idx="0">
+            <a:schemeClr val="accent1"/>
+          </a:effectRef>
+          <a:fontRef idx="minor">
+            <a:schemeClr val="lt1"/>
+          </a:fontRef>
+        </p:style>
+        <p:txBody>
+          <a:bodyPr rtlCol="0" anchor="ctr"/>
+          <a:lstStyle/>
+          <a:p>
+            <a:pPr algn="ctr"/>
+            <a:endParaRPr lang="en-US"/>
+          </a:p>
+        </p:txBody>
+      </p:sp>
+      <p:sp>
+        <p:nvSpPr>
+          <p:cNvPr id="84" name="Rectangle 83">
+            <a:extLst>
+              <a:ext uri="{FF2B5EF4-FFF2-40B4-BE49-F238E27FC236}">
+                <a16:creationId xmlns:a16="http://schemas.microsoft.com/office/drawing/2014/main" id="{8C0A3681-DD7F-4B8C-B353-257F754BBF88}"/>
+              </a:ext>
+            </a:extLst>
+          </p:cNvPr>
+          <p:cNvSpPr/>
+          <p:nvPr/>
+        </p:nvSpPr>
+        <p:spPr>
+          <a:xfrm>
+            <a:off x="2499181" y="1764129"/>
+            <a:ext cx="478019" cy="756565"/>
+          </a:xfrm>
+          <a:prstGeom prst="rect">
+            <a:avLst/>
+          </a:prstGeom>
+          <a:solidFill>
+            <a:schemeClr val="bg2">
+              <a:alpha val="24000"/>
+            </a:schemeClr>
+          </a:solidFill>
+        </p:spPr>
+        <p:style>
+          <a:lnRef idx="2">
+            <a:schemeClr val="accent1">
+              <a:shade val="50000"/>
+            </a:schemeClr>
+          </a:lnRef>
+          <a:fillRef idx="1">
+            <a:schemeClr val="accent1"/>
+          </a:fillRef>
+          <a:effectRef idx="0">
+            <a:schemeClr val="accent1"/>
+          </a:effectRef>
+          <a:fontRef idx="minor">
+            <a:schemeClr val="lt1"/>
+          </a:fontRef>
+        </p:style>
+        <p:txBody>
+          <a:bodyPr rtlCol="0" anchor="ctr"/>
+          <a:lstStyle/>
+          <a:p>
+            <a:pPr algn="ctr"/>
+            <a:endParaRPr lang="en-US"/>
+          </a:p>
+        </p:txBody>
+      </p:sp>
+      <p:cxnSp>
+        <p:nvCxnSpPr>
+          <p:cNvPr id="87" name="Connector: Elbow 86">
+            <a:extLst>
+              <a:ext uri="{FF2B5EF4-FFF2-40B4-BE49-F238E27FC236}">
+                <a16:creationId xmlns:a16="http://schemas.microsoft.com/office/drawing/2014/main" id="{94707077-BE96-4CC3-8201-68523B0F4547}"/>
+              </a:ext>
+            </a:extLst>
+          </p:cNvPr>
+          <p:cNvCxnSpPr>
+            <a:cxnSpLocks/>
+            <a:stCxn id="7" idx="1"/>
+          </p:cNvCxnSpPr>
+          <p:nvPr/>
+        </p:nvCxnSpPr>
+        <p:spPr>
+          <a:xfrm rot="10800000" flipV="1">
+            <a:off x="5121352" y="4448495"/>
+            <a:ext cx="2740841" cy="340121"/>
+          </a:xfrm>
+          <a:prstGeom prst="bentConnector3">
+            <a:avLst>
+              <a:gd name="adj1" fmla="val 100043"/>
+            </a:avLst>
+          </a:prstGeom>
+          <a:ln w="38100">
             <a:solidFill>
               <a:schemeClr val="tx2">
-                <a:lumMod val="20000"/>
-                <a:lumOff val="80000"/>
+                <a:lumMod val="60000"/>
+                <a:lumOff val="40000"/>
               </a:schemeClr>
             </a:solidFill>
-            <a:tailEnd type="triangle"/>
+            <a:headEnd type="none" w="med" len="med"/>
+            <a:tailEnd type="triangle" w="med" len="med"/>
+          </a:ln>
+        </p:spPr>
+        <p:style>
+          <a:lnRef idx="1">
+            <a:schemeClr val="accent1"/>
+          </a:lnRef>
+          <a:fillRef idx="0">
+            <a:schemeClr val="accent1"/>
+          </a:fillRef>
+          <a:effectRef idx="0">
+            <a:schemeClr val="accent1"/>
+          </a:effectRef>
+          <a:fontRef idx="minor">
+            <a:schemeClr val="tx1"/>
+          </a:fontRef>
+        </p:style>
+      </p:cxnSp>
+      <p:cxnSp>
+        <p:nvCxnSpPr>
+          <p:cNvPr id="42" name="Straight Arrow Connector 41">
+            <a:extLst>
+              <a:ext uri="{FF2B5EF4-FFF2-40B4-BE49-F238E27FC236}">
+                <a16:creationId xmlns:a16="http://schemas.microsoft.com/office/drawing/2014/main" id="{4AC68526-52BC-4408-BC18-9F278528A16B}"/>
+              </a:ext>
+            </a:extLst>
+          </p:cNvPr>
+          <p:cNvCxnSpPr>
+            <a:cxnSpLocks/>
+            <a:stCxn id="5" idx="2"/>
+            <a:endCxn id="4" idx="0"/>
+          </p:cNvCxnSpPr>
+          <p:nvPr/>
+        </p:nvCxnSpPr>
+        <p:spPr>
+          <a:xfrm flipH="1">
+            <a:off x="6406770" y="4270441"/>
+            <a:ext cx="1" cy="1581013"/>
+          </a:xfrm>
+          <a:prstGeom prst="straightConnector1">
+            <a:avLst/>
+          </a:prstGeom>
+          <a:ln w="57150">
+            <a:solidFill>
+              <a:schemeClr val="accent1">
+                <a:lumMod val="75000"/>
+              </a:schemeClr>
+            </a:solidFill>
+            <a:headEnd type="none" w="med" len="med"/>
+            <a:tailEnd type="triangle" w="med" len="med"/>
+          </a:ln>
+        </p:spPr>
+        <p:style>
+          <a:lnRef idx="1">
+            <a:schemeClr val="accent1"/>
+          </a:lnRef>
+          <a:fillRef idx="0">
+            <a:schemeClr val="accent1"/>
+          </a:fillRef>
+          <a:effectRef idx="0">
+            <a:schemeClr val="accent1"/>
+          </a:effectRef>
+          <a:fontRef idx="minor">
+            <a:schemeClr val="tx1"/>
+          </a:fontRef>
+        </p:style>
+      </p:cxnSp>
+      <p:cxnSp>
+        <p:nvCxnSpPr>
+          <p:cNvPr id="55" name="Connector: Elbow 54">
+            <a:extLst>
+              <a:ext uri="{FF2B5EF4-FFF2-40B4-BE49-F238E27FC236}">
+                <a16:creationId xmlns:a16="http://schemas.microsoft.com/office/drawing/2014/main" id="{C1146F2E-B518-4B55-8013-C2CDE9E9E56D}"/>
+              </a:ext>
+            </a:extLst>
+          </p:cNvPr>
+          <p:cNvCxnSpPr>
+            <a:cxnSpLocks/>
+          </p:cNvCxnSpPr>
+          <p:nvPr/>
+        </p:nvCxnSpPr>
+        <p:spPr>
+          <a:xfrm rot="10800000" flipV="1">
+            <a:off x="6802199" y="3084978"/>
+            <a:ext cx="1567855" cy="319625"/>
+          </a:xfrm>
+          <a:prstGeom prst="bentConnector3">
+            <a:avLst>
+              <a:gd name="adj1" fmla="val 99904"/>
+            </a:avLst>
+          </a:prstGeom>
+          <a:ln w="38100">
+            <a:solidFill>
+              <a:schemeClr val="tx2">
+                <a:lumMod val="60000"/>
+                <a:lumOff val="40000"/>
+              </a:schemeClr>
+            </a:solidFill>
+            <a:headEnd type="none" w="med" len="med"/>
+            <a:tailEnd type="triangle" w="med" len="med"/>
           </a:ln>
         </p:spPr>
         <p:style>
@@ -5989,7 +5985,7 @@
     </p:spTree>
     <p:extLst>
       <p:ext uri="{BB962C8B-B14F-4D97-AF65-F5344CB8AC3E}">
-        <p14:creationId xmlns:p14="http://schemas.microsoft.com/office/powerpoint/2010/main" val="1741648203"/>
+        <p14:creationId xmlns:p14="http://schemas.microsoft.com/office/powerpoint/2010/main" val="4253621875"/>
       </p:ext>
     </p:extLst>
   </p:cSld>

</xml_diff>